<commit_message>
Minor updates to scripts & presentations
</commit_message>
<xml_diff>
--- a/presentations/6 - Data Manipulation with tidyverse.pptx
+++ b/presentations/6 - Data Manipulation with tidyverse.pptx
@@ -4,6 +4,9 @@
   <p:sldMasterIdLst>
     <p:sldMasterId id="2147483648" r:id="rId1"/>
   </p:sldMasterIdLst>
+  <p:notesMasterIdLst>
+    <p:notesMasterId r:id="rId25"/>
+  </p:notesMasterIdLst>
   <p:sldIdLst>
     <p:sldId id="256" r:id="rId2"/>
     <p:sldId id="334" r:id="rId3"/>
@@ -25,8 +28,9 @@
     <p:sldId id="352" r:id="rId19"/>
     <p:sldId id="353" r:id="rId20"/>
     <p:sldId id="358" r:id="rId21"/>
-    <p:sldId id="356" r:id="rId22"/>
-    <p:sldId id="357" r:id="rId23"/>
+    <p:sldId id="359" r:id="rId22"/>
+    <p:sldId id="356" r:id="rId23"/>
+    <p:sldId id="357" r:id="rId24"/>
   </p:sldIdLst>
   <p:sldSz cx="12192000" cy="6858000"/>
   <p:notesSz cx="6858000" cy="9144000"/>
@@ -133,6 +137,1923 @@
 </p:presentation>
 </file>
 
+<file path=ppt/notesMasters/notesMaster1.xml><?xml version="1.0" encoding="utf-8"?>
+<p:notesMaster xmlns:a="http://schemas.openxmlformats.org/drawingml/2006/main" xmlns:r="http://schemas.openxmlformats.org/officeDocument/2006/relationships" xmlns:p="http://schemas.openxmlformats.org/presentationml/2006/main">
+  <p:cSld>
+    <p:bg>
+      <p:bgRef idx="1001">
+        <a:schemeClr val="bg1"/>
+      </p:bgRef>
+    </p:bg>
+    <p:spTree>
+      <p:nvGrpSpPr>
+        <p:cNvPr id="1" name=""/>
+        <p:cNvGrpSpPr/>
+        <p:nvPr/>
+      </p:nvGrpSpPr>
+      <p:grpSpPr>
+        <a:xfrm>
+          <a:off x="0" y="0"/>
+          <a:ext cx="0" cy="0"/>
+          <a:chOff x="0" y="0"/>
+          <a:chExt cx="0" cy="0"/>
+        </a:xfrm>
+      </p:grpSpPr>
+      <p:sp>
+        <p:nvSpPr>
+          <p:cNvPr id="2" name="Header Placeholder 1"/>
+          <p:cNvSpPr>
+            <a:spLocks noGrp="1"/>
+          </p:cNvSpPr>
+          <p:nvPr>
+            <p:ph type="hdr" sz="quarter"/>
+          </p:nvPr>
+        </p:nvSpPr>
+        <p:spPr>
+          <a:xfrm>
+            <a:off x="0" y="0"/>
+            <a:ext cx="2971800" cy="458788"/>
+          </a:xfrm>
+          <a:prstGeom prst="rect">
+            <a:avLst/>
+          </a:prstGeom>
+        </p:spPr>
+        <p:txBody>
+          <a:bodyPr vert="horz" lIns="91440" tIns="45720" rIns="91440" bIns="45720" rtlCol="0"/>
+          <a:lstStyle>
+            <a:lvl1pPr algn="l">
+              <a:defRPr sz="1200"/>
+            </a:lvl1pPr>
+          </a:lstStyle>
+          <a:p>
+            <a:endParaRPr lang="en-US"/>
+          </a:p>
+        </p:txBody>
+      </p:sp>
+      <p:sp>
+        <p:nvSpPr>
+          <p:cNvPr id="3" name="Date Placeholder 2"/>
+          <p:cNvSpPr>
+            <a:spLocks noGrp="1"/>
+          </p:cNvSpPr>
+          <p:nvPr>
+            <p:ph type="dt" idx="1"/>
+          </p:nvPr>
+        </p:nvSpPr>
+        <p:spPr>
+          <a:xfrm>
+            <a:off x="3884613" y="0"/>
+            <a:ext cx="2971800" cy="458788"/>
+          </a:xfrm>
+          <a:prstGeom prst="rect">
+            <a:avLst/>
+          </a:prstGeom>
+        </p:spPr>
+        <p:txBody>
+          <a:bodyPr vert="horz" lIns="91440" tIns="45720" rIns="91440" bIns="45720" rtlCol="0"/>
+          <a:lstStyle>
+            <a:lvl1pPr algn="r">
+              <a:defRPr sz="1200"/>
+            </a:lvl1pPr>
+          </a:lstStyle>
+          <a:p>
+            <a:fld id="{44727DCD-98E8-45AD-855C-EF4D34C86DE5}" type="datetimeFigureOut">
+              <a:rPr lang="en-US" smtClean="0"/>
+              <a:t>11/1/2023</a:t>
+            </a:fld>
+            <a:endParaRPr lang="en-US"/>
+          </a:p>
+        </p:txBody>
+      </p:sp>
+      <p:sp>
+        <p:nvSpPr>
+          <p:cNvPr id="4" name="Slide Image Placeholder 3"/>
+          <p:cNvSpPr>
+            <a:spLocks noGrp="1" noRot="1" noChangeAspect="1"/>
+          </p:cNvSpPr>
+          <p:nvPr>
+            <p:ph type="sldImg" idx="2"/>
+          </p:nvPr>
+        </p:nvSpPr>
+        <p:spPr>
+          <a:xfrm>
+            <a:off x="685800" y="1143000"/>
+            <a:ext cx="5486400" cy="3086100"/>
+          </a:xfrm>
+          <a:prstGeom prst="rect">
+            <a:avLst/>
+          </a:prstGeom>
+          <a:noFill/>
+          <a:ln w="12700">
+            <a:solidFill>
+              <a:prstClr val="black"/>
+            </a:solidFill>
+          </a:ln>
+        </p:spPr>
+        <p:txBody>
+          <a:bodyPr vert="horz" lIns="91440" tIns="45720" rIns="91440" bIns="45720" rtlCol="0" anchor="ctr"/>
+          <a:lstStyle/>
+          <a:p>
+            <a:endParaRPr lang="en-US"/>
+          </a:p>
+        </p:txBody>
+      </p:sp>
+      <p:sp>
+        <p:nvSpPr>
+          <p:cNvPr id="5" name="Notes Placeholder 4"/>
+          <p:cNvSpPr>
+            <a:spLocks noGrp="1"/>
+          </p:cNvSpPr>
+          <p:nvPr>
+            <p:ph type="body" sz="quarter" idx="3"/>
+          </p:nvPr>
+        </p:nvSpPr>
+        <p:spPr>
+          <a:xfrm>
+            <a:off x="685800" y="4400550"/>
+            <a:ext cx="5486400" cy="3600450"/>
+          </a:xfrm>
+          <a:prstGeom prst="rect">
+            <a:avLst/>
+          </a:prstGeom>
+        </p:spPr>
+        <p:txBody>
+          <a:bodyPr vert="horz" lIns="91440" tIns="45720" rIns="91440" bIns="45720" rtlCol="0"/>
+          <a:lstStyle/>
+          <a:p>
+            <a:pPr lvl="0"/>
+            <a:r>
+              <a:rPr lang="en-US"/>
+              <a:t>Click to edit Master text styles</a:t>
+            </a:r>
+          </a:p>
+          <a:p>
+            <a:pPr lvl="1"/>
+            <a:r>
+              <a:rPr lang="en-US"/>
+              <a:t>Second level</a:t>
+            </a:r>
+          </a:p>
+          <a:p>
+            <a:pPr lvl="2"/>
+            <a:r>
+              <a:rPr lang="en-US"/>
+              <a:t>Third level</a:t>
+            </a:r>
+          </a:p>
+          <a:p>
+            <a:pPr lvl="3"/>
+            <a:r>
+              <a:rPr lang="en-US"/>
+              <a:t>Fourth level</a:t>
+            </a:r>
+          </a:p>
+          <a:p>
+            <a:pPr lvl="4"/>
+            <a:r>
+              <a:rPr lang="en-US"/>
+              <a:t>Fifth level</a:t>
+            </a:r>
+          </a:p>
+        </p:txBody>
+      </p:sp>
+      <p:sp>
+        <p:nvSpPr>
+          <p:cNvPr id="6" name="Footer Placeholder 5"/>
+          <p:cNvSpPr>
+            <a:spLocks noGrp="1"/>
+          </p:cNvSpPr>
+          <p:nvPr>
+            <p:ph type="ftr" sz="quarter" idx="4"/>
+          </p:nvPr>
+        </p:nvSpPr>
+        <p:spPr>
+          <a:xfrm>
+            <a:off x="0" y="8685213"/>
+            <a:ext cx="2971800" cy="458787"/>
+          </a:xfrm>
+          <a:prstGeom prst="rect">
+            <a:avLst/>
+          </a:prstGeom>
+        </p:spPr>
+        <p:txBody>
+          <a:bodyPr vert="horz" lIns="91440" tIns="45720" rIns="91440" bIns="45720" rtlCol="0" anchor="b"/>
+          <a:lstStyle>
+            <a:lvl1pPr algn="l">
+              <a:defRPr sz="1200"/>
+            </a:lvl1pPr>
+          </a:lstStyle>
+          <a:p>
+            <a:endParaRPr lang="en-US"/>
+          </a:p>
+        </p:txBody>
+      </p:sp>
+      <p:sp>
+        <p:nvSpPr>
+          <p:cNvPr id="7" name="Slide Number Placeholder 6"/>
+          <p:cNvSpPr>
+            <a:spLocks noGrp="1"/>
+          </p:cNvSpPr>
+          <p:nvPr>
+            <p:ph type="sldNum" sz="quarter" idx="5"/>
+          </p:nvPr>
+        </p:nvSpPr>
+        <p:spPr>
+          <a:xfrm>
+            <a:off x="3884613" y="8685213"/>
+            <a:ext cx="2971800" cy="458787"/>
+          </a:xfrm>
+          <a:prstGeom prst="rect">
+            <a:avLst/>
+          </a:prstGeom>
+        </p:spPr>
+        <p:txBody>
+          <a:bodyPr vert="horz" lIns="91440" tIns="45720" rIns="91440" bIns="45720" rtlCol="0" anchor="b"/>
+          <a:lstStyle>
+            <a:lvl1pPr algn="r">
+              <a:defRPr sz="1200"/>
+            </a:lvl1pPr>
+          </a:lstStyle>
+          <a:p>
+            <a:fld id="{9CE90544-A233-4575-9A72-45E28C6405FF}" type="slidenum">
+              <a:rPr lang="en-US" smtClean="0"/>
+              <a:t>‹#›</a:t>
+            </a:fld>
+            <a:endParaRPr lang="en-US"/>
+          </a:p>
+        </p:txBody>
+      </p:sp>
+    </p:spTree>
+    <p:extLst>
+      <p:ext uri="{BB962C8B-B14F-4D97-AF65-F5344CB8AC3E}">
+        <p14:creationId xmlns:p14="http://schemas.microsoft.com/office/powerpoint/2010/main" val="3412639292"/>
+      </p:ext>
+    </p:extLst>
+  </p:cSld>
+  <p:clrMap bg1="lt1" tx1="dk1" bg2="lt2" tx2="dk2" accent1="accent1" accent2="accent2" accent3="accent3" accent4="accent4" accent5="accent5" accent6="accent6" hlink="hlink" folHlink="folHlink"/>
+  <p:notesStyle>
+    <a:lvl1pPr marL="0" algn="l" defTabSz="914400" rtl="0" eaLnBrk="1" latinLnBrk="0" hangingPunct="1">
+      <a:defRPr sz="1200" kern="1200">
+        <a:solidFill>
+          <a:schemeClr val="tx1"/>
+        </a:solidFill>
+        <a:latin typeface="+mn-lt"/>
+        <a:ea typeface="+mn-ea"/>
+        <a:cs typeface="+mn-cs"/>
+      </a:defRPr>
+    </a:lvl1pPr>
+    <a:lvl2pPr marL="457200" algn="l" defTabSz="914400" rtl="0" eaLnBrk="1" latinLnBrk="0" hangingPunct="1">
+      <a:defRPr sz="1200" kern="1200">
+        <a:solidFill>
+          <a:schemeClr val="tx1"/>
+        </a:solidFill>
+        <a:latin typeface="+mn-lt"/>
+        <a:ea typeface="+mn-ea"/>
+        <a:cs typeface="+mn-cs"/>
+      </a:defRPr>
+    </a:lvl2pPr>
+    <a:lvl3pPr marL="914400" algn="l" defTabSz="914400" rtl="0" eaLnBrk="1" latinLnBrk="0" hangingPunct="1">
+      <a:defRPr sz="1200" kern="1200">
+        <a:solidFill>
+          <a:schemeClr val="tx1"/>
+        </a:solidFill>
+        <a:latin typeface="+mn-lt"/>
+        <a:ea typeface="+mn-ea"/>
+        <a:cs typeface="+mn-cs"/>
+      </a:defRPr>
+    </a:lvl3pPr>
+    <a:lvl4pPr marL="1371600" algn="l" defTabSz="914400" rtl="0" eaLnBrk="1" latinLnBrk="0" hangingPunct="1">
+      <a:defRPr sz="1200" kern="1200">
+        <a:solidFill>
+          <a:schemeClr val="tx1"/>
+        </a:solidFill>
+        <a:latin typeface="+mn-lt"/>
+        <a:ea typeface="+mn-ea"/>
+        <a:cs typeface="+mn-cs"/>
+      </a:defRPr>
+    </a:lvl4pPr>
+    <a:lvl5pPr marL="1828800" algn="l" defTabSz="914400" rtl="0" eaLnBrk="1" latinLnBrk="0" hangingPunct="1">
+      <a:defRPr sz="1200" kern="1200">
+        <a:solidFill>
+          <a:schemeClr val="tx1"/>
+        </a:solidFill>
+        <a:latin typeface="+mn-lt"/>
+        <a:ea typeface="+mn-ea"/>
+        <a:cs typeface="+mn-cs"/>
+      </a:defRPr>
+    </a:lvl5pPr>
+    <a:lvl6pPr marL="2286000" algn="l" defTabSz="914400" rtl="0" eaLnBrk="1" latinLnBrk="0" hangingPunct="1">
+      <a:defRPr sz="1200" kern="1200">
+        <a:solidFill>
+          <a:schemeClr val="tx1"/>
+        </a:solidFill>
+        <a:latin typeface="+mn-lt"/>
+        <a:ea typeface="+mn-ea"/>
+        <a:cs typeface="+mn-cs"/>
+      </a:defRPr>
+    </a:lvl6pPr>
+    <a:lvl7pPr marL="2743200" algn="l" defTabSz="914400" rtl="0" eaLnBrk="1" latinLnBrk="0" hangingPunct="1">
+      <a:defRPr sz="1200" kern="1200">
+        <a:solidFill>
+          <a:schemeClr val="tx1"/>
+        </a:solidFill>
+        <a:latin typeface="+mn-lt"/>
+        <a:ea typeface="+mn-ea"/>
+        <a:cs typeface="+mn-cs"/>
+      </a:defRPr>
+    </a:lvl7pPr>
+    <a:lvl8pPr marL="3200400" algn="l" defTabSz="914400" rtl="0" eaLnBrk="1" latinLnBrk="0" hangingPunct="1">
+      <a:defRPr sz="1200" kern="1200">
+        <a:solidFill>
+          <a:schemeClr val="tx1"/>
+        </a:solidFill>
+        <a:latin typeface="+mn-lt"/>
+        <a:ea typeface="+mn-ea"/>
+        <a:cs typeface="+mn-cs"/>
+      </a:defRPr>
+    </a:lvl8pPr>
+    <a:lvl9pPr marL="3657600" algn="l" defTabSz="914400" rtl="0" eaLnBrk="1" latinLnBrk="0" hangingPunct="1">
+      <a:defRPr sz="1200" kern="1200">
+        <a:solidFill>
+          <a:schemeClr val="tx1"/>
+        </a:solidFill>
+        <a:latin typeface="+mn-lt"/>
+        <a:ea typeface="+mn-ea"/>
+        <a:cs typeface="+mn-cs"/>
+      </a:defRPr>
+    </a:lvl9pPr>
+  </p:notesStyle>
+</p:notesMaster>
+</file>
+
+<file path=ppt/notesSlides/notesSlide1.xml><?xml version="1.0" encoding="utf-8"?>
+<p:notes xmlns:a="http://schemas.openxmlformats.org/drawingml/2006/main" xmlns:r="http://schemas.openxmlformats.org/officeDocument/2006/relationships" xmlns:p="http://schemas.openxmlformats.org/presentationml/2006/main">
+  <p:cSld>
+    <p:spTree>
+      <p:nvGrpSpPr>
+        <p:cNvPr id="1" name=""/>
+        <p:cNvGrpSpPr/>
+        <p:nvPr/>
+      </p:nvGrpSpPr>
+      <p:grpSpPr>
+        <a:xfrm>
+          <a:off x="0" y="0"/>
+          <a:ext cx="0" cy="0"/>
+          <a:chOff x="0" y="0"/>
+          <a:chExt cx="0" cy="0"/>
+        </a:xfrm>
+      </p:grpSpPr>
+      <p:sp>
+        <p:nvSpPr>
+          <p:cNvPr id="2" name="Slide Image Placeholder 1"/>
+          <p:cNvSpPr>
+            <a:spLocks noGrp="1" noRot="1" noChangeAspect="1"/>
+          </p:cNvSpPr>
+          <p:nvPr>
+            <p:ph type="sldImg"/>
+          </p:nvPr>
+        </p:nvSpPr>
+        <p:spPr/>
+      </p:sp>
+      <p:sp>
+        <p:nvSpPr>
+          <p:cNvPr id="3" name="Notes Placeholder 2"/>
+          <p:cNvSpPr>
+            <a:spLocks noGrp="1"/>
+          </p:cNvSpPr>
+          <p:nvPr>
+            <p:ph type="body" idx="1"/>
+          </p:nvPr>
+        </p:nvSpPr>
+        <p:spPr/>
+        <p:txBody>
+          <a:bodyPr/>
+          <a:lstStyle/>
+          <a:p>
+            <a:r>
+              <a:rPr lang="en-US" sz="1050" dirty="0"/>
+              <a:t>So we’re doing something a little bit annoying, in that we just gave you a bunch of tools to work with data, and now we’re going to teach a WHOLE NEW set of tools that have a whole new syntax.</a:t>
+            </a:r>
+          </a:p>
+          <a:p>
+            <a:endParaRPr lang="en-US" sz="1050" dirty="0"/>
+          </a:p>
+          <a:p>
+            <a:r>
+              <a:rPr lang="en-US" sz="1050" dirty="0"/>
+              <a:t>If you made the observation that data manipulation in what we call “Base R” is a bit clunky &amp; hard to read, you’d be right.</a:t>
+            </a:r>
+          </a:p>
+          <a:p>
+            <a:endParaRPr lang="en-US" sz="1050" dirty="0"/>
+          </a:p>
+          <a:p>
+            <a:r>
+              <a:rPr lang="en-US" sz="1050" dirty="0"/>
+              <a:t>So we’re going to introduce some more modern tools (called the </a:t>
+            </a:r>
+            <a:r>
+              <a:rPr lang="en-US" sz="1050" dirty="0" err="1"/>
+              <a:t>tidyverse</a:t>
+            </a:r>
+            <a:r>
+              <a:rPr lang="en-US" sz="1050" dirty="0"/>
+              <a:t>) that will probably streamline things a bit.</a:t>
+            </a:r>
+          </a:p>
+        </p:txBody>
+      </p:sp>
+      <p:sp>
+        <p:nvSpPr>
+          <p:cNvPr id="4" name="Slide Number Placeholder 3"/>
+          <p:cNvSpPr>
+            <a:spLocks noGrp="1"/>
+          </p:cNvSpPr>
+          <p:nvPr>
+            <p:ph type="sldNum" sz="quarter" idx="5"/>
+          </p:nvPr>
+        </p:nvSpPr>
+        <p:spPr/>
+        <p:txBody>
+          <a:bodyPr/>
+          <a:lstStyle/>
+          <a:p>
+            <a:fld id="{9CE90544-A233-4575-9A72-45E28C6405FF}" type="slidenum">
+              <a:rPr lang="en-US" smtClean="0"/>
+              <a:t>2</a:t>
+            </a:fld>
+            <a:endParaRPr lang="en-US"/>
+          </a:p>
+        </p:txBody>
+      </p:sp>
+    </p:spTree>
+    <p:extLst>
+      <p:ext uri="{BB962C8B-B14F-4D97-AF65-F5344CB8AC3E}">
+        <p14:creationId xmlns:p14="http://schemas.microsoft.com/office/powerpoint/2010/main" val="110366317"/>
+      </p:ext>
+    </p:extLst>
+  </p:cSld>
+  <p:clrMapOvr>
+    <a:masterClrMapping/>
+  </p:clrMapOvr>
+</p:notes>
+</file>
+
+<file path=ppt/notesSlides/notesSlide10.xml><?xml version="1.0" encoding="utf-8"?>
+<p:notes xmlns:a="http://schemas.openxmlformats.org/drawingml/2006/main" xmlns:r="http://schemas.openxmlformats.org/officeDocument/2006/relationships" xmlns:p="http://schemas.openxmlformats.org/presentationml/2006/main">
+  <p:cSld>
+    <p:spTree>
+      <p:nvGrpSpPr>
+        <p:cNvPr id="1" name=""/>
+        <p:cNvGrpSpPr/>
+        <p:nvPr/>
+      </p:nvGrpSpPr>
+      <p:grpSpPr>
+        <a:xfrm>
+          <a:off x="0" y="0"/>
+          <a:ext cx="0" cy="0"/>
+          <a:chOff x="0" y="0"/>
+          <a:chExt cx="0" cy="0"/>
+        </a:xfrm>
+      </p:grpSpPr>
+      <p:sp>
+        <p:nvSpPr>
+          <p:cNvPr id="2" name="Slide Image Placeholder 1"/>
+          <p:cNvSpPr>
+            <a:spLocks noGrp="1" noRot="1" noChangeAspect="1"/>
+          </p:cNvSpPr>
+          <p:nvPr>
+            <p:ph type="sldImg"/>
+          </p:nvPr>
+        </p:nvSpPr>
+        <p:spPr/>
+      </p:sp>
+      <p:sp>
+        <p:nvSpPr>
+          <p:cNvPr id="3" name="Notes Placeholder 2"/>
+          <p:cNvSpPr>
+            <a:spLocks noGrp="1"/>
+          </p:cNvSpPr>
+          <p:nvPr>
+            <p:ph type="body" idx="1"/>
+          </p:nvPr>
+        </p:nvSpPr>
+        <p:spPr/>
+        <p:txBody>
+          <a:bodyPr/>
+          <a:lstStyle/>
+          <a:p>
+            <a:r>
+              <a:rPr lang="en-US" dirty="0"/>
+              <a:t>So!  Let’s play with this, but first define some fake data</a:t>
+            </a:r>
+          </a:p>
+        </p:txBody>
+      </p:sp>
+      <p:sp>
+        <p:nvSpPr>
+          <p:cNvPr id="4" name="Slide Number Placeholder 3"/>
+          <p:cNvSpPr>
+            <a:spLocks noGrp="1"/>
+          </p:cNvSpPr>
+          <p:nvPr>
+            <p:ph type="sldNum" sz="quarter" idx="5"/>
+          </p:nvPr>
+        </p:nvSpPr>
+        <p:spPr/>
+        <p:txBody>
+          <a:bodyPr/>
+          <a:lstStyle/>
+          <a:p>
+            <a:fld id="{9CE90544-A233-4575-9A72-45E28C6405FF}" type="slidenum">
+              <a:rPr lang="en-US" smtClean="0"/>
+              <a:t>13</a:t>
+            </a:fld>
+            <a:endParaRPr lang="en-US"/>
+          </a:p>
+        </p:txBody>
+      </p:sp>
+    </p:spTree>
+    <p:extLst>
+      <p:ext uri="{BB962C8B-B14F-4D97-AF65-F5344CB8AC3E}">
+        <p14:creationId xmlns:p14="http://schemas.microsoft.com/office/powerpoint/2010/main" val="2230045952"/>
+      </p:ext>
+    </p:extLst>
+  </p:cSld>
+  <p:clrMapOvr>
+    <a:masterClrMapping/>
+  </p:clrMapOvr>
+</p:notes>
+</file>
+
+<file path=ppt/notesSlides/notesSlide11.xml><?xml version="1.0" encoding="utf-8"?>
+<p:notes xmlns:a="http://schemas.openxmlformats.org/drawingml/2006/main" xmlns:r="http://schemas.openxmlformats.org/officeDocument/2006/relationships" xmlns:p="http://schemas.openxmlformats.org/presentationml/2006/main">
+  <p:cSld>
+    <p:spTree>
+      <p:nvGrpSpPr>
+        <p:cNvPr id="1" name=""/>
+        <p:cNvGrpSpPr/>
+        <p:nvPr/>
+      </p:nvGrpSpPr>
+      <p:grpSpPr>
+        <a:xfrm>
+          <a:off x="0" y="0"/>
+          <a:ext cx="0" cy="0"/>
+          <a:chOff x="0" y="0"/>
+          <a:chExt cx="0" cy="0"/>
+        </a:xfrm>
+      </p:grpSpPr>
+      <p:sp>
+        <p:nvSpPr>
+          <p:cNvPr id="2" name="Slide Image Placeholder 1"/>
+          <p:cNvSpPr>
+            <a:spLocks noGrp="1" noRot="1" noChangeAspect="1"/>
+          </p:cNvSpPr>
+          <p:nvPr>
+            <p:ph type="sldImg"/>
+          </p:nvPr>
+        </p:nvSpPr>
+        <p:spPr/>
+      </p:sp>
+      <p:sp>
+        <p:nvSpPr>
+          <p:cNvPr id="3" name="Notes Placeholder 2"/>
+          <p:cNvSpPr>
+            <a:spLocks noGrp="1"/>
+          </p:cNvSpPr>
+          <p:nvPr>
+            <p:ph type="body" idx="1"/>
+          </p:nvPr>
+        </p:nvSpPr>
+        <p:spPr/>
+        <p:txBody>
+          <a:bodyPr/>
+          <a:lstStyle/>
+          <a:p>
+            <a:r>
+              <a:rPr lang="en-US" dirty="0"/>
+              <a:t>Select() is a way of selecting a subset of COLUMNS</a:t>
+            </a:r>
+          </a:p>
+          <a:p>
+            <a:endParaRPr lang="en-US" dirty="0"/>
+          </a:p>
+          <a:p>
+            <a:r>
+              <a:rPr lang="en-US" dirty="0"/>
+              <a:t>So here’s our original </a:t>
+            </a:r>
+            <a:r>
+              <a:rPr lang="en-US" dirty="0" err="1"/>
+              <a:t>data.frame</a:t>
+            </a:r>
+            <a:r>
+              <a:rPr lang="en-US" dirty="0"/>
+              <a:t>, and here’s what a select() call looks like </a:t>
+            </a:r>
+          </a:p>
+        </p:txBody>
+      </p:sp>
+      <p:sp>
+        <p:nvSpPr>
+          <p:cNvPr id="4" name="Slide Number Placeholder 3"/>
+          <p:cNvSpPr>
+            <a:spLocks noGrp="1"/>
+          </p:cNvSpPr>
+          <p:nvPr>
+            <p:ph type="sldNum" sz="quarter" idx="5"/>
+          </p:nvPr>
+        </p:nvSpPr>
+        <p:spPr/>
+        <p:txBody>
+          <a:bodyPr/>
+          <a:lstStyle/>
+          <a:p>
+            <a:fld id="{9CE90544-A233-4575-9A72-45E28C6405FF}" type="slidenum">
+              <a:rPr lang="en-US" smtClean="0"/>
+              <a:t>14</a:t>
+            </a:fld>
+            <a:endParaRPr lang="en-US"/>
+          </a:p>
+        </p:txBody>
+      </p:sp>
+    </p:spTree>
+    <p:extLst>
+      <p:ext uri="{BB962C8B-B14F-4D97-AF65-F5344CB8AC3E}">
+        <p14:creationId xmlns:p14="http://schemas.microsoft.com/office/powerpoint/2010/main" val="858211112"/>
+      </p:ext>
+    </p:extLst>
+  </p:cSld>
+  <p:clrMapOvr>
+    <a:masterClrMapping/>
+  </p:clrMapOvr>
+</p:notes>
+</file>
+
+<file path=ppt/notesSlides/notesSlide12.xml><?xml version="1.0" encoding="utf-8"?>
+<p:notes xmlns:a="http://schemas.openxmlformats.org/drawingml/2006/main" xmlns:r="http://schemas.openxmlformats.org/officeDocument/2006/relationships" xmlns:p="http://schemas.openxmlformats.org/presentationml/2006/main">
+  <p:cSld>
+    <p:spTree>
+      <p:nvGrpSpPr>
+        <p:cNvPr id="1" name=""/>
+        <p:cNvGrpSpPr/>
+        <p:nvPr/>
+      </p:nvGrpSpPr>
+      <p:grpSpPr>
+        <a:xfrm>
+          <a:off x="0" y="0"/>
+          <a:ext cx="0" cy="0"/>
+          <a:chOff x="0" y="0"/>
+          <a:chExt cx="0" cy="0"/>
+        </a:xfrm>
+      </p:grpSpPr>
+      <p:sp>
+        <p:nvSpPr>
+          <p:cNvPr id="2" name="Slide Image Placeholder 1"/>
+          <p:cNvSpPr>
+            <a:spLocks noGrp="1" noRot="1" noChangeAspect="1"/>
+          </p:cNvSpPr>
+          <p:nvPr>
+            <p:ph type="sldImg"/>
+          </p:nvPr>
+        </p:nvSpPr>
+        <p:spPr/>
+      </p:sp>
+      <p:sp>
+        <p:nvSpPr>
+          <p:cNvPr id="3" name="Notes Placeholder 2"/>
+          <p:cNvSpPr>
+            <a:spLocks noGrp="1"/>
+          </p:cNvSpPr>
+          <p:nvPr>
+            <p:ph type="body" idx="1"/>
+          </p:nvPr>
+        </p:nvSpPr>
+        <p:spPr/>
+        <p:txBody>
+          <a:bodyPr/>
+          <a:lstStyle/>
+          <a:p>
+            <a:r>
+              <a:rPr lang="en-US" dirty="0"/>
+              <a:t>Filter is similar, but it gives a subset of ROWS</a:t>
+            </a:r>
+          </a:p>
+        </p:txBody>
+      </p:sp>
+      <p:sp>
+        <p:nvSpPr>
+          <p:cNvPr id="4" name="Slide Number Placeholder 3"/>
+          <p:cNvSpPr>
+            <a:spLocks noGrp="1"/>
+          </p:cNvSpPr>
+          <p:nvPr>
+            <p:ph type="sldNum" sz="quarter" idx="5"/>
+          </p:nvPr>
+        </p:nvSpPr>
+        <p:spPr/>
+        <p:txBody>
+          <a:bodyPr/>
+          <a:lstStyle/>
+          <a:p>
+            <a:fld id="{9CE90544-A233-4575-9A72-45E28C6405FF}" type="slidenum">
+              <a:rPr lang="en-US" smtClean="0"/>
+              <a:t>15</a:t>
+            </a:fld>
+            <a:endParaRPr lang="en-US"/>
+          </a:p>
+        </p:txBody>
+      </p:sp>
+    </p:spTree>
+    <p:extLst>
+      <p:ext uri="{BB962C8B-B14F-4D97-AF65-F5344CB8AC3E}">
+        <p14:creationId xmlns:p14="http://schemas.microsoft.com/office/powerpoint/2010/main" val="496942422"/>
+      </p:ext>
+    </p:extLst>
+  </p:cSld>
+  <p:clrMapOvr>
+    <a:masterClrMapping/>
+  </p:clrMapOvr>
+</p:notes>
+</file>
+
+<file path=ppt/notesSlides/notesSlide13.xml><?xml version="1.0" encoding="utf-8"?>
+<p:notes xmlns:a="http://schemas.openxmlformats.org/drawingml/2006/main" xmlns:r="http://schemas.openxmlformats.org/officeDocument/2006/relationships" xmlns:p="http://schemas.openxmlformats.org/presentationml/2006/main">
+  <p:cSld>
+    <p:spTree>
+      <p:nvGrpSpPr>
+        <p:cNvPr id="1" name=""/>
+        <p:cNvGrpSpPr/>
+        <p:nvPr/>
+      </p:nvGrpSpPr>
+      <p:grpSpPr>
+        <a:xfrm>
+          <a:off x="0" y="0"/>
+          <a:ext cx="0" cy="0"/>
+          <a:chOff x="0" y="0"/>
+          <a:chExt cx="0" cy="0"/>
+        </a:xfrm>
+      </p:grpSpPr>
+      <p:sp>
+        <p:nvSpPr>
+          <p:cNvPr id="2" name="Slide Image Placeholder 1"/>
+          <p:cNvSpPr>
+            <a:spLocks noGrp="1" noRot="1" noChangeAspect="1"/>
+          </p:cNvSpPr>
+          <p:nvPr>
+            <p:ph type="sldImg"/>
+          </p:nvPr>
+        </p:nvSpPr>
+        <p:spPr/>
+      </p:sp>
+      <p:sp>
+        <p:nvSpPr>
+          <p:cNvPr id="3" name="Notes Placeholder 2"/>
+          <p:cNvSpPr>
+            <a:spLocks noGrp="1"/>
+          </p:cNvSpPr>
+          <p:nvPr>
+            <p:ph type="body" idx="1"/>
+          </p:nvPr>
+        </p:nvSpPr>
+        <p:spPr/>
+        <p:txBody>
+          <a:bodyPr/>
+          <a:lstStyle/>
+          <a:p>
+            <a:r>
+              <a:rPr lang="en-US" dirty="0"/>
+              <a:t>Mutate() allows you to make new columns, or transform existing ones</a:t>
+            </a:r>
+          </a:p>
+        </p:txBody>
+      </p:sp>
+      <p:sp>
+        <p:nvSpPr>
+          <p:cNvPr id="4" name="Slide Number Placeholder 3"/>
+          <p:cNvSpPr>
+            <a:spLocks noGrp="1"/>
+          </p:cNvSpPr>
+          <p:nvPr>
+            <p:ph type="sldNum" sz="quarter" idx="5"/>
+          </p:nvPr>
+        </p:nvSpPr>
+        <p:spPr/>
+        <p:txBody>
+          <a:bodyPr/>
+          <a:lstStyle/>
+          <a:p>
+            <a:fld id="{9CE90544-A233-4575-9A72-45E28C6405FF}" type="slidenum">
+              <a:rPr lang="en-US" smtClean="0"/>
+              <a:t>16</a:t>
+            </a:fld>
+            <a:endParaRPr lang="en-US"/>
+          </a:p>
+        </p:txBody>
+      </p:sp>
+    </p:spTree>
+    <p:extLst>
+      <p:ext uri="{BB962C8B-B14F-4D97-AF65-F5344CB8AC3E}">
+        <p14:creationId xmlns:p14="http://schemas.microsoft.com/office/powerpoint/2010/main" val="2047801327"/>
+      </p:ext>
+    </p:extLst>
+  </p:cSld>
+  <p:clrMapOvr>
+    <a:masterClrMapping/>
+  </p:clrMapOvr>
+</p:notes>
+</file>
+
+<file path=ppt/notesSlides/notesSlide14.xml><?xml version="1.0" encoding="utf-8"?>
+<p:notes xmlns:a="http://schemas.openxmlformats.org/drawingml/2006/main" xmlns:r="http://schemas.openxmlformats.org/officeDocument/2006/relationships" xmlns:p="http://schemas.openxmlformats.org/presentationml/2006/main">
+  <p:cSld>
+    <p:spTree>
+      <p:nvGrpSpPr>
+        <p:cNvPr id="1" name=""/>
+        <p:cNvGrpSpPr/>
+        <p:nvPr/>
+      </p:nvGrpSpPr>
+      <p:grpSpPr>
+        <a:xfrm>
+          <a:off x="0" y="0"/>
+          <a:ext cx="0" cy="0"/>
+          <a:chOff x="0" y="0"/>
+          <a:chExt cx="0" cy="0"/>
+        </a:xfrm>
+      </p:grpSpPr>
+      <p:sp>
+        <p:nvSpPr>
+          <p:cNvPr id="2" name="Slide Image Placeholder 1"/>
+          <p:cNvSpPr>
+            <a:spLocks noGrp="1" noRot="1" noChangeAspect="1"/>
+          </p:cNvSpPr>
+          <p:nvPr>
+            <p:ph type="sldImg"/>
+          </p:nvPr>
+        </p:nvSpPr>
+        <p:spPr/>
+      </p:sp>
+      <p:sp>
+        <p:nvSpPr>
+          <p:cNvPr id="3" name="Notes Placeholder 2"/>
+          <p:cNvSpPr>
+            <a:spLocks noGrp="1"/>
+          </p:cNvSpPr>
+          <p:nvPr>
+            <p:ph type="body" idx="1"/>
+          </p:nvPr>
+        </p:nvSpPr>
+        <p:spPr/>
+        <p:txBody>
+          <a:bodyPr/>
+          <a:lstStyle/>
+          <a:p>
+            <a:r>
+              <a:rPr lang="en-US" dirty="0"/>
+              <a:t>Rename() is awesome.  I love rename().</a:t>
+            </a:r>
+          </a:p>
+        </p:txBody>
+      </p:sp>
+      <p:sp>
+        <p:nvSpPr>
+          <p:cNvPr id="4" name="Slide Number Placeholder 3"/>
+          <p:cNvSpPr>
+            <a:spLocks noGrp="1"/>
+          </p:cNvSpPr>
+          <p:nvPr>
+            <p:ph type="sldNum" sz="quarter" idx="5"/>
+          </p:nvPr>
+        </p:nvSpPr>
+        <p:spPr/>
+        <p:txBody>
+          <a:bodyPr/>
+          <a:lstStyle/>
+          <a:p>
+            <a:fld id="{9CE90544-A233-4575-9A72-45E28C6405FF}" type="slidenum">
+              <a:rPr lang="en-US" smtClean="0"/>
+              <a:t>18</a:t>
+            </a:fld>
+            <a:endParaRPr lang="en-US"/>
+          </a:p>
+        </p:txBody>
+      </p:sp>
+    </p:spTree>
+    <p:extLst>
+      <p:ext uri="{BB962C8B-B14F-4D97-AF65-F5344CB8AC3E}">
+        <p14:creationId xmlns:p14="http://schemas.microsoft.com/office/powerpoint/2010/main" val="259489172"/>
+      </p:ext>
+    </p:extLst>
+  </p:cSld>
+  <p:clrMapOvr>
+    <a:masterClrMapping/>
+  </p:clrMapOvr>
+</p:notes>
+</file>
+
+<file path=ppt/notesSlides/notesSlide15.xml><?xml version="1.0" encoding="utf-8"?>
+<p:notes xmlns:a="http://schemas.openxmlformats.org/drawingml/2006/main" xmlns:r="http://schemas.openxmlformats.org/officeDocument/2006/relationships" xmlns:p="http://schemas.openxmlformats.org/presentationml/2006/main">
+  <p:cSld>
+    <p:spTree>
+      <p:nvGrpSpPr>
+        <p:cNvPr id="1" name=""/>
+        <p:cNvGrpSpPr/>
+        <p:nvPr/>
+      </p:nvGrpSpPr>
+      <p:grpSpPr>
+        <a:xfrm>
+          <a:off x="0" y="0"/>
+          <a:ext cx="0" cy="0"/>
+          <a:chOff x="0" y="0"/>
+          <a:chExt cx="0" cy="0"/>
+        </a:xfrm>
+      </p:grpSpPr>
+      <p:sp>
+        <p:nvSpPr>
+          <p:cNvPr id="2" name="Slide Image Placeholder 1"/>
+          <p:cNvSpPr>
+            <a:spLocks noGrp="1" noRot="1" noChangeAspect="1"/>
+          </p:cNvSpPr>
+          <p:nvPr>
+            <p:ph type="sldImg"/>
+          </p:nvPr>
+        </p:nvSpPr>
+        <p:spPr/>
+      </p:sp>
+      <p:sp>
+        <p:nvSpPr>
+          <p:cNvPr id="3" name="Notes Placeholder 2"/>
+          <p:cNvSpPr>
+            <a:spLocks noGrp="1"/>
+          </p:cNvSpPr>
+          <p:nvPr>
+            <p:ph type="body" idx="1"/>
+          </p:nvPr>
+        </p:nvSpPr>
+        <p:spPr/>
+        <p:txBody>
+          <a:bodyPr/>
+          <a:lstStyle/>
+          <a:p>
+            <a:r>
+              <a:rPr lang="en-US" dirty="0" err="1"/>
+              <a:t>Left_join</a:t>
+            </a:r>
+            <a:r>
+              <a:rPr lang="en-US" dirty="0"/>
+              <a:t>() isn’t one of the “core” </a:t>
+            </a:r>
+            <a:r>
+              <a:rPr lang="en-US" dirty="0" err="1"/>
+              <a:t>dplyr</a:t>
+            </a:r>
+            <a:r>
+              <a:rPr lang="en-US" dirty="0"/>
+              <a:t> functions, but it’s just so amazing we’re talking about it anyway.</a:t>
+            </a:r>
+          </a:p>
+          <a:p>
+            <a:endParaRPr lang="en-US" dirty="0"/>
+          </a:p>
+          <a:p>
+            <a:r>
+              <a:rPr lang="en-US" dirty="0"/>
+              <a:t>Let’s say we have a lookup table of station names, and want to add a new column that pulls station name by station number.</a:t>
+            </a:r>
+          </a:p>
+        </p:txBody>
+      </p:sp>
+      <p:sp>
+        <p:nvSpPr>
+          <p:cNvPr id="4" name="Slide Number Placeholder 3"/>
+          <p:cNvSpPr>
+            <a:spLocks noGrp="1"/>
+          </p:cNvSpPr>
+          <p:nvPr>
+            <p:ph type="sldNum" sz="quarter" idx="5"/>
+          </p:nvPr>
+        </p:nvSpPr>
+        <p:spPr/>
+        <p:txBody>
+          <a:bodyPr/>
+          <a:lstStyle/>
+          <a:p>
+            <a:fld id="{9CE90544-A233-4575-9A72-45E28C6405FF}" type="slidenum">
+              <a:rPr lang="en-US" smtClean="0"/>
+              <a:t>19</a:t>
+            </a:fld>
+            <a:endParaRPr lang="en-US"/>
+          </a:p>
+        </p:txBody>
+      </p:sp>
+    </p:spTree>
+    <p:extLst>
+      <p:ext uri="{BB962C8B-B14F-4D97-AF65-F5344CB8AC3E}">
+        <p14:creationId xmlns:p14="http://schemas.microsoft.com/office/powerpoint/2010/main" val="2718591157"/>
+      </p:ext>
+    </p:extLst>
+  </p:cSld>
+  <p:clrMapOvr>
+    <a:masterClrMapping/>
+  </p:clrMapOvr>
+</p:notes>
+</file>
+
+<file path=ppt/notesSlides/notesSlide16.xml><?xml version="1.0" encoding="utf-8"?>
+<p:notes xmlns:a="http://schemas.openxmlformats.org/drawingml/2006/main" xmlns:r="http://schemas.openxmlformats.org/officeDocument/2006/relationships" xmlns:p="http://schemas.openxmlformats.org/presentationml/2006/main">
+  <p:cSld>
+    <p:spTree>
+      <p:nvGrpSpPr>
+        <p:cNvPr id="1" name=""/>
+        <p:cNvGrpSpPr/>
+        <p:nvPr/>
+      </p:nvGrpSpPr>
+      <p:grpSpPr>
+        <a:xfrm>
+          <a:off x="0" y="0"/>
+          <a:ext cx="0" cy="0"/>
+          <a:chOff x="0" y="0"/>
+          <a:chExt cx="0" cy="0"/>
+        </a:xfrm>
+      </p:grpSpPr>
+      <p:sp>
+        <p:nvSpPr>
+          <p:cNvPr id="2" name="Slide Image Placeholder 1"/>
+          <p:cNvSpPr>
+            <a:spLocks noGrp="1" noRot="1" noChangeAspect="1"/>
+          </p:cNvSpPr>
+          <p:nvPr>
+            <p:ph type="sldImg"/>
+          </p:nvPr>
+        </p:nvSpPr>
+        <p:spPr/>
+      </p:sp>
+      <p:sp>
+        <p:nvSpPr>
+          <p:cNvPr id="3" name="Notes Placeholder 2"/>
+          <p:cNvSpPr>
+            <a:spLocks noGrp="1"/>
+          </p:cNvSpPr>
+          <p:nvPr>
+            <p:ph type="body" idx="1"/>
+          </p:nvPr>
+        </p:nvSpPr>
+        <p:spPr/>
+        <p:txBody>
+          <a:bodyPr/>
+          <a:lstStyle/>
+          <a:p>
+            <a:r>
+              <a:rPr lang="en-US" dirty="0"/>
+              <a:t>And there’s a bajillion more data verbs for common data operations</a:t>
+            </a:r>
+          </a:p>
+        </p:txBody>
+      </p:sp>
+      <p:sp>
+        <p:nvSpPr>
+          <p:cNvPr id="4" name="Slide Number Placeholder 3"/>
+          <p:cNvSpPr>
+            <a:spLocks noGrp="1"/>
+          </p:cNvSpPr>
+          <p:nvPr>
+            <p:ph type="sldNum" sz="quarter" idx="5"/>
+          </p:nvPr>
+        </p:nvSpPr>
+        <p:spPr/>
+        <p:txBody>
+          <a:bodyPr/>
+          <a:lstStyle/>
+          <a:p>
+            <a:fld id="{9CE90544-A233-4575-9A72-45E28C6405FF}" type="slidenum">
+              <a:rPr lang="en-US" smtClean="0"/>
+              <a:t>20</a:t>
+            </a:fld>
+            <a:endParaRPr lang="en-US"/>
+          </a:p>
+        </p:txBody>
+      </p:sp>
+    </p:spTree>
+    <p:extLst>
+      <p:ext uri="{BB962C8B-B14F-4D97-AF65-F5344CB8AC3E}">
+        <p14:creationId xmlns:p14="http://schemas.microsoft.com/office/powerpoint/2010/main" val="2351382977"/>
+      </p:ext>
+    </p:extLst>
+  </p:cSld>
+  <p:clrMapOvr>
+    <a:masterClrMapping/>
+  </p:clrMapOvr>
+</p:notes>
+</file>
+
+<file path=ppt/notesSlides/notesSlide17.xml><?xml version="1.0" encoding="utf-8"?>
+<p:notes xmlns:a="http://schemas.openxmlformats.org/drawingml/2006/main" xmlns:r="http://schemas.openxmlformats.org/officeDocument/2006/relationships" xmlns:p="http://schemas.openxmlformats.org/presentationml/2006/main">
+  <p:cSld>
+    <p:spTree>
+      <p:nvGrpSpPr>
+        <p:cNvPr id="1" name=""/>
+        <p:cNvGrpSpPr/>
+        <p:nvPr/>
+      </p:nvGrpSpPr>
+      <p:grpSpPr>
+        <a:xfrm>
+          <a:off x="0" y="0"/>
+          <a:ext cx="0" cy="0"/>
+          <a:chOff x="0" y="0"/>
+          <a:chExt cx="0" cy="0"/>
+        </a:xfrm>
+      </p:grpSpPr>
+      <p:sp>
+        <p:nvSpPr>
+          <p:cNvPr id="2" name="Slide Image Placeholder 1"/>
+          <p:cNvSpPr>
+            <a:spLocks noGrp="1" noRot="1" noChangeAspect="1"/>
+          </p:cNvSpPr>
+          <p:nvPr>
+            <p:ph type="sldImg"/>
+          </p:nvPr>
+        </p:nvSpPr>
+        <p:spPr/>
+      </p:sp>
+      <p:sp>
+        <p:nvSpPr>
+          <p:cNvPr id="3" name="Notes Placeholder 2"/>
+          <p:cNvSpPr>
+            <a:spLocks noGrp="1"/>
+          </p:cNvSpPr>
+          <p:nvPr>
+            <p:ph type="body" idx="1"/>
+          </p:nvPr>
+        </p:nvSpPr>
+        <p:spPr/>
+        <p:txBody>
+          <a:bodyPr/>
+          <a:lstStyle/>
+          <a:p>
+            <a:r>
+              <a:rPr lang="en-US" sz="1050" dirty="0"/>
+              <a:t>It’s worth circling back</a:t>
+            </a:r>
+          </a:p>
+        </p:txBody>
+      </p:sp>
+      <p:sp>
+        <p:nvSpPr>
+          <p:cNvPr id="4" name="Slide Number Placeholder 3"/>
+          <p:cNvSpPr>
+            <a:spLocks noGrp="1"/>
+          </p:cNvSpPr>
+          <p:nvPr>
+            <p:ph type="sldNum" sz="quarter" idx="5"/>
+          </p:nvPr>
+        </p:nvSpPr>
+        <p:spPr/>
+        <p:txBody>
+          <a:bodyPr/>
+          <a:lstStyle/>
+          <a:p>
+            <a:fld id="{9CE90544-A233-4575-9A72-45E28C6405FF}" type="slidenum">
+              <a:rPr lang="en-US" smtClean="0"/>
+              <a:t>21</a:t>
+            </a:fld>
+            <a:endParaRPr lang="en-US"/>
+          </a:p>
+        </p:txBody>
+      </p:sp>
+    </p:spTree>
+    <p:extLst>
+      <p:ext uri="{BB962C8B-B14F-4D97-AF65-F5344CB8AC3E}">
+        <p14:creationId xmlns:p14="http://schemas.microsoft.com/office/powerpoint/2010/main" val="3574270906"/>
+      </p:ext>
+    </p:extLst>
+  </p:cSld>
+  <p:clrMapOvr>
+    <a:masterClrMapping/>
+  </p:clrMapOvr>
+</p:notes>
+</file>
+
+<file path=ppt/notesSlides/notesSlide2.xml><?xml version="1.0" encoding="utf-8"?>
+<p:notes xmlns:a="http://schemas.openxmlformats.org/drawingml/2006/main" xmlns:r="http://schemas.openxmlformats.org/officeDocument/2006/relationships" xmlns:p="http://schemas.openxmlformats.org/presentationml/2006/main">
+  <p:cSld>
+    <p:spTree>
+      <p:nvGrpSpPr>
+        <p:cNvPr id="1" name=""/>
+        <p:cNvGrpSpPr/>
+        <p:nvPr/>
+      </p:nvGrpSpPr>
+      <p:grpSpPr>
+        <a:xfrm>
+          <a:off x="0" y="0"/>
+          <a:ext cx="0" cy="0"/>
+          <a:chOff x="0" y="0"/>
+          <a:chExt cx="0" cy="0"/>
+        </a:xfrm>
+      </p:grpSpPr>
+      <p:sp>
+        <p:nvSpPr>
+          <p:cNvPr id="2" name="Slide Image Placeholder 1"/>
+          <p:cNvSpPr>
+            <a:spLocks noGrp="1" noRot="1" noChangeAspect="1"/>
+          </p:cNvSpPr>
+          <p:nvPr>
+            <p:ph type="sldImg"/>
+          </p:nvPr>
+        </p:nvSpPr>
+        <p:spPr/>
+      </p:sp>
+      <p:sp>
+        <p:nvSpPr>
+          <p:cNvPr id="3" name="Notes Placeholder 2"/>
+          <p:cNvSpPr>
+            <a:spLocks noGrp="1"/>
+          </p:cNvSpPr>
+          <p:nvPr>
+            <p:ph type="body" idx="1"/>
+          </p:nvPr>
+        </p:nvSpPr>
+        <p:spPr/>
+        <p:txBody>
+          <a:bodyPr/>
+          <a:lstStyle/>
+          <a:p>
+            <a:r>
+              <a:rPr lang="en-US" dirty="0"/>
+              <a:t>To give some motivation, here’s a bit of schematic of my typical data workflow before embracing the </a:t>
+            </a:r>
+            <a:r>
+              <a:rPr lang="en-US" dirty="0" err="1"/>
+              <a:t>tidyverse</a:t>
+            </a:r>
+            <a:r>
+              <a:rPr lang="en-US" dirty="0"/>
+              <a:t>…</a:t>
+            </a:r>
+          </a:p>
+        </p:txBody>
+      </p:sp>
+      <p:sp>
+        <p:nvSpPr>
+          <p:cNvPr id="4" name="Slide Number Placeholder 3"/>
+          <p:cNvSpPr>
+            <a:spLocks noGrp="1"/>
+          </p:cNvSpPr>
+          <p:nvPr>
+            <p:ph type="sldNum" sz="quarter" idx="5"/>
+          </p:nvPr>
+        </p:nvSpPr>
+        <p:spPr/>
+        <p:txBody>
+          <a:bodyPr/>
+          <a:lstStyle/>
+          <a:p>
+            <a:fld id="{9CE90544-A233-4575-9A72-45E28C6405FF}" type="slidenum">
+              <a:rPr lang="en-US" smtClean="0"/>
+              <a:t>3</a:t>
+            </a:fld>
+            <a:endParaRPr lang="en-US"/>
+          </a:p>
+        </p:txBody>
+      </p:sp>
+    </p:spTree>
+    <p:extLst>
+      <p:ext uri="{BB962C8B-B14F-4D97-AF65-F5344CB8AC3E}">
+        <p14:creationId xmlns:p14="http://schemas.microsoft.com/office/powerpoint/2010/main" val="3121537038"/>
+      </p:ext>
+    </p:extLst>
+  </p:cSld>
+  <p:clrMapOvr>
+    <a:masterClrMapping/>
+  </p:clrMapOvr>
+</p:notes>
+</file>
+
+<file path=ppt/notesSlides/notesSlide3.xml><?xml version="1.0" encoding="utf-8"?>
+<p:notes xmlns:a="http://schemas.openxmlformats.org/drawingml/2006/main" xmlns:r="http://schemas.openxmlformats.org/officeDocument/2006/relationships" xmlns:p="http://schemas.openxmlformats.org/presentationml/2006/main">
+  <p:cSld>
+    <p:spTree>
+      <p:nvGrpSpPr>
+        <p:cNvPr id="1" name=""/>
+        <p:cNvGrpSpPr/>
+        <p:nvPr/>
+      </p:nvGrpSpPr>
+      <p:grpSpPr>
+        <a:xfrm>
+          <a:off x="0" y="0"/>
+          <a:ext cx="0" cy="0"/>
+          <a:chOff x="0" y="0"/>
+          <a:chExt cx="0" cy="0"/>
+        </a:xfrm>
+      </p:grpSpPr>
+      <p:sp>
+        <p:nvSpPr>
+          <p:cNvPr id="2" name="Slide Image Placeholder 1"/>
+          <p:cNvSpPr>
+            <a:spLocks noGrp="1" noRot="1" noChangeAspect="1"/>
+          </p:cNvSpPr>
+          <p:nvPr>
+            <p:ph type="sldImg"/>
+          </p:nvPr>
+        </p:nvSpPr>
+        <p:spPr/>
+      </p:sp>
+      <p:sp>
+        <p:nvSpPr>
+          <p:cNvPr id="3" name="Notes Placeholder 2"/>
+          <p:cNvSpPr>
+            <a:spLocks noGrp="1"/>
+          </p:cNvSpPr>
+          <p:nvPr>
+            <p:ph type="body" idx="1"/>
+          </p:nvPr>
+        </p:nvSpPr>
+        <p:spPr/>
+        <p:txBody>
+          <a:bodyPr/>
+          <a:lstStyle/>
+          <a:p>
+            <a:r>
+              <a:rPr lang="en-US" dirty="0"/>
+              <a:t>So hold that mental picture in your mind, while we introduce a new, extremely powerful operator: the PIPE</a:t>
+            </a:r>
+          </a:p>
+        </p:txBody>
+      </p:sp>
+      <p:sp>
+        <p:nvSpPr>
+          <p:cNvPr id="4" name="Slide Number Placeholder 3"/>
+          <p:cNvSpPr>
+            <a:spLocks noGrp="1"/>
+          </p:cNvSpPr>
+          <p:nvPr>
+            <p:ph type="sldNum" sz="quarter" idx="5"/>
+          </p:nvPr>
+        </p:nvSpPr>
+        <p:spPr/>
+        <p:txBody>
+          <a:bodyPr/>
+          <a:lstStyle/>
+          <a:p>
+            <a:fld id="{9CE90544-A233-4575-9A72-45E28C6405FF}" type="slidenum">
+              <a:rPr lang="en-US" smtClean="0"/>
+              <a:t>6</a:t>
+            </a:fld>
+            <a:endParaRPr lang="en-US"/>
+          </a:p>
+        </p:txBody>
+      </p:sp>
+    </p:spTree>
+    <p:extLst>
+      <p:ext uri="{BB962C8B-B14F-4D97-AF65-F5344CB8AC3E}">
+        <p14:creationId xmlns:p14="http://schemas.microsoft.com/office/powerpoint/2010/main" val="1828897796"/>
+      </p:ext>
+    </p:extLst>
+  </p:cSld>
+  <p:clrMapOvr>
+    <a:masterClrMapping/>
+  </p:clrMapOvr>
+</p:notes>
+</file>
+
+<file path=ppt/notesSlides/notesSlide4.xml><?xml version="1.0" encoding="utf-8"?>
+<p:notes xmlns:a="http://schemas.openxmlformats.org/drawingml/2006/main" xmlns:r="http://schemas.openxmlformats.org/officeDocument/2006/relationships" xmlns:p="http://schemas.openxmlformats.org/presentationml/2006/main">
+  <p:cSld>
+    <p:spTree>
+      <p:nvGrpSpPr>
+        <p:cNvPr id="1" name=""/>
+        <p:cNvGrpSpPr/>
+        <p:nvPr/>
+      </p:nvGrpSpPr>
+      <p:grpSpPr>
+        <a:xfrm>
+          <a:off x="0" y="0"/>
+          <a:ext cx="0" cy="0"/>
+          <a:chOff x="0" y="0"/>
+          <a:chExt cx="0" cy="0"/>
+        </a:xfrm>
+      </p:grpSpPr>
+      <p:sp>
+        <p:nvSpPr>
+          <p:cNvPr id="2" name="Slide Image Placeholder 1"/>
+          <p:cNvSpPr>
+            <a:spLocks noGrp="1" noRot="1" noChangeAspect="1"/>
+          </p:cNvSpPr>
+          <p:nvPr>
+            <p:ph type="sldImg"/>
+          </p:nvPr>
+        </p:nvSpPr>
+        <p:spPr/>
+      </p:sp>
+      <p:sp>
+        <p:nvSpPr>
+          <p:cNvPr id="3" name="Notes Placeholder 2"/>
+          <p:cNvSpPr>
+            <a:spLocks noGrp="1"/>
+          </p:cNvSpPr>
+          <p:nvPr>
+            <p:ph type="body" idx="1"/>
+          </p:nvPr>
+        </p:nvSpPr>
+        <p:spPr/>
+        <p:txBody>
+          <a:bodyPr/>
+          <a:lstStyle/>
+          <a:p>
+            <a:r>
+              <a:rPr lang="en-US" dirty="0"/>
+              <a:t>Maybe it’s easier to think of this the other way around.</a:t>
+            </a:r>
+          </a:p>
+        </p:txBody>
+      </p:sp>
+      <p:sp>
+        <p:nvSpPr>
+          <p:cNvPr id="4" name="Slide Number Placeholder 3"/>
+          <p:cNvSpPr>
+            <a:spLocks noGrp="1"/>
+          </p:cNvSpPr>
+          <p:nvPr>
+            <p:ph type="sldNum" sz="quarter" idx="5"/>
+          </p:nvPr>
+        </p:nvSpPr>
+        <p:spPr/>
+        <p:txBody>
+          <a:bodyPr/>
+          <a:lstStyle/>
+          <a:p>
+            <a:fld id="{9CE90544-A233-4575-9A72-45E28C6405FF}" type="slidenum">
+              <a:rPr lang="en-US" smtClean="0"/>
+              <a:t>7</a:t>
+            </a:fld>
+            <a:endParaRPr lang="en-US"/>
+          </a:p>
+        </p:txBody>
+      </p:sp>
+    </p:spTree>
+    <p:extLst>
+      <p:ext uri="{BB962C8B-B14F-4D97-AF65-F5344CB8AC3E}">
+        <p14:creationId xmlns:p14="http://schemas.microsoft.com/office/powerpoint/2010/main" val="1698371197"/>
+      </p:ext>
+    </p:extLst>
+  </p:cSld>
+  <p:clrMapOvr>
+    <a:masterClrMapping/>
+  </p:clrMapOvr>
+</p:notes>
+</file>
+
+<file path=ppt/notesSlides/notesSlide5.xml><?xml version="1.0" encoding="utf-8"?>
+<p:notes xmlns:a="http://schemas.openxmlformats.org/drawingml/2006/main" xmlns:r="http://schemas.openxmlformats.org/officeDocument/2006/relationships" xmlns:p="http://schemas.openxmlformats.org/presentationml/2006/main">
+  <p:cSld>
+    <p:spTree>
+      <p:nvGrpSpPr>
+        <p:cNvPr id="1" name=""/>
+        <p:cNvGrpSpPr/>
+        <p:nvPr/>
+      </p:nvGrpSpPr>
+      <p:grpSpPr>
+        <a:xfrm>
+          <a:off x="0" y="0"/>
+          <a:ext cx="0" cy="0"/>
+          <a:chOff x="0" y="0"/>
+          <a:chExt cx="0" cy="0"/>
+        </a:xfrm>
+      </p:grpSpPr>
+      <p:sp>
+        <p:nvSpPr>
+          <p:cNvPr id="2" name="Slide Image Placeholder 1"/>
+          <p:cNvSpPr>
+            <a:spLocks noGrp="1" noRot="1" noChangeAspect="1"/>
+          </p:cNvSpPr>
+          <p:nvPr>
+            <p:ph type="sldImg"/>
+          </p:nvPr>
+        </p:nvSpPr>
+        <p:spPr/>
+      </p:sp>
+      <p:sp>
+        <p:nvSpPr>
+          <p:cNvPr id="3" name="Notes Placeholder 2"/>
+          <p:cNvSpPr>
+            <a:spLocks noGrp="1"/>
+          </p:cNvSpPr>
+          <p:nvPr>
+            <p:ph type="body" idx="1"/>
+          </p:nvPr>
+        </p:nvSpPr>
+        <p:spPr/>
+        <p:txBody>
+          <a:bodyPr/>
+          <a:lstStyle/>
+          <a:p>
+            <a:r>
+              <a:rPr lang="en-US" dirty="0"/>
+              <a:t>Where this really matters is if you have a whole sequence of operations.</a:t>
+            </a:r>
+          </a:p>
+          <a:p>
+            <a:endParaRPr lang="en-US" dirty="0"/>
+          </a:p>
+          <a:p>
+            <a:r>
+              <a:rPr lang="en-US" dirty="0"/>
+              <a:t>You COULD write it as a nested function call, and it would work… but it’s much more natural to write steps in sequence.</a:t>
+            </a:r>
+          </a:p>
+        </p:txBody>
+      </p:sp>
+      <p:sp>
+        <p:nvSpPr>
+          <p:cNvPr id="4" name="Slide Number Placeholder 3"/>
+          <p:cNvSpPr>
+            <a:spLocks noGrp="1"/>
+          </p:cNvSpPr>
+          <p:nvPr>
+            <p:ph type="sldNum" sz="quarter" idx="5"/>
+          </p:nvPr>
+        </p:nvSpPr>
+        <p:spPr/>
+        <p:txBody>
+          <a:bodyPr/>
+          <a:lstStyle/>
+          <a:p>
+            <a:fld id="{9CE90544-A233-4575-9A72-45E28C6405FF}" type="slidenum">
+              <a:rPr lang="en-US" smtClean="0"/>
+              <a:t>8</a:t>
+            </a:fld>
+            <a:endParaRPr lang="en-US"/>
+          </a:p>
+        </p:txBody>
+      </p:sp>
+    </p:spTree>
+    <p:extLst>
+      <p:ext uri="{BB962C8B-B14F-4D97-AF65-F5344CB8AC3E}">
+        <p14:creationId xmlns:p14="http://schemas.microsoft.com/office/powerpoint/2010/main" val="2837396954"/>
+      </p:ext>
+    </p:extLst>
+  </p:cSld>
+  <p:clrMapOvr>
+    <a:masterClrMapping/>
+  </p:clrMapOvr>
+</p:notes>
+</file>
+
+<file path=ppt/notesSlides/notesSlide6.xml><?xml version="1.0" encoding="utf-8"?>
+<p:notes xmlns:a="http://schemas.openxmlformats.org/drawingml/2006/main" xmlns:r="http://schemas.openxmlformats.org/officeDocument/2006/relationships" xmlns:p="http://schemas.openxmlformats.org/presentationml/2006/main">
+  <p:cSld>
+    <p:spTree>
+      <p:nvGrpSpPr>
+        <p:cNvPr id="1" name=""/>
+        <p:cNvGrpSpPr/>
+        <p:nvPr/>
+      </p:nvGrpSpPr>
+      <p:grpSpPr>
+        <a:xfrm>
+          <a:off x="0" y="0"/>
+          <a:ext cx="0" cy="0"/>
+          <a:chOff x="0" y="0"/>
+          <a:chExt cx="0" cy="0"/>
+        </a:xfrm>
+      </p:grpSpPr>
+      <p:sp>
+        <p:nvSpPr>
+          <p:cNvPr id="2" name="Slide Image Placeholder 1"/>
+          <p:cNvSpPr>
+            <a:spLocks noGrp="1" noRot="1" noChangeAspect="1"/>
+          </p:cNvSpPr>
+          <p:nvPr>
+            <p:ph type="sldImg"/>
+          </p:nvPr>
+        </p:nvSpPr>
+        <p:spPr/>
+      </p:sp>
+      <p:sp>
+        <p:nvSpPr>
+          <p:cNvPr id="3" name="Notes Placeholder 2"/>
+          <p:cNvSpPr>
+            <a:spLocks noGrp="1"/>
+          </p:cNvSpPr>
+          <p:nvPr>
+            <p:ph type="body" idx="1"/>
+          </p:nvPr>
+        </p:nvSpPr>
+        <p:spPr/>
+        <p:txBody>
+          <a:bodyPr/>
+          <a:lstStyle/>
+          <a:p>
+            <a:r>
+              <a:rPr lang="en-US" dirty="0"/>
+              <a:t>So we have this mental model of the thing we started with, then what happens to it…</a:t>
+            </a:r>
+          </a:p>
+        </p:txBody>
+      </p:sp>
+      <p:sp>
+        <p:nvSpPr>
+          <p:cNvPr id="4" name="Slide Number Placeholder 3"/>
+          <p:cNvSpPr>
+            <a:spLocks noGrp="1"/>
+          </p:cNvSpPr>
+          <p:nvPr>
+            <p:ph type="sldNum" sz="quarter" idx="5"/>
+          </p:nvPr>
+        </p:nvSpPr>
+        <p:spPr/>
+        <p:txBody>
+          <a:bodyPr/>
+          <a:lstStyle/>
+          <a:p>
+            <a:fld id="{9CE90544-A233-4575-9A72-45E28C6405FF}" type="slidenum">
+              <a:rPr lang="en-US" smtClean="0"/>
+              <a:t>9</a:t>
+            </a:fld>
+            <a:endParaRPr lang="en-US"/>
+          </a:p>
+        </p:txBody>
+      </p:sp>
+    </p:spTree>
+    <p:extLst>
+      <p:ext uri="{BB962C8B-B14F-4D97-AF65-F5344CB8AC3E}">
+        <p14:creationId xmlns:p14="http://schemas.microsoft.com/office/powerpoint/2010/main" val="2397028042"/>
+      </p:ext>
+    </p:extLst>
+  </p:cSld>
+  <p:clrMapOvr>
+    <a:masterClrMapping/>
+  </p:clrMapOvr>
+</p:notes>
+</file>
+
+<file path=ppt/notesSlides/notesSlide7.xml><?xml version="1.0" encoding="utf-8"?>
+<p:notes xmlns:a="http://schemas.openxmlformats.org/drawingml/2006/main" xmlns:r="http://schemas.openxmlformats.org/officeDocument/2006/relationships" xmlns:p="http://schemas.openxmlformats.org/presentationml/2006/main">
+  <p:cSld>
+    <p:spTree>
+      <p:nvGrpSpPr>
+        <p:cNvPr id="1" name=""/>
+        <p:cNvGrpSpPr/>
+        <p:nvPr/>
+      </p:nvGrpSpPr>
+      <p:grpSpPr>
+        <a:xfrm>
+          <a:off x="0" y="0"/>
+          <a:ext cx="0" cy="0"/>
+          <a:chOff x="0" y="0"/>
+          <a:chExt cx="0" cy="0"/>
+        </a:xfrm>
+      </p:grpSpPr>
+      <p:sp>
+        <p:nvSpPr>
+          <p:cNvPr id="2" name="Slide Image Placeholder 1"/>
+          <p:cNvSpPr>
+            <a:spLocks noGrp="1" noRot="1" noChangeAspect="1"/>
+          </p:cNvSpPr>
+          <p:nvPr>
+            <p:ph type="sldImg"/>
+          </p:nvPr>
+        </p:nvSpPr>
+        <p:spPr/>
+      </p:sp>
+      <p:sp>
+        <p:nvSpPr>
+          <p:cNvPr id="3" name="Notes Placeholder 2"/>
+          <p:cNvSpPr>
+            <a:spLocks noGrp="1"/>
+          </p:cNvSpPr>
+          <p:nvPr>
+            <p:ph type="body" idx="1"/>
+          </p:nvPr>
+        </p:nvSpPr>
+        <p:spPr/>
+        <p:txBody>
+          <a:bodyPr/>
+          <a:lstStyle/>
+          <a:p>
+            <a:r>
+              <a:rPr lang="en-US" dirty="0"/>
+              <a:t>So with that picture firmly in your mind…</a:t>
+            </a:r>
+          </a:p>
+        </p:txBody>
+      </p:sp>
+      <p:sp>
+        <p:nvSpPr>
+          <p:cNvPr id="4" name="Slide Number Placeholder 3"/>
+          <p:cNvSpPr>
+            <a:spLocks noGrp="1"/>
+          </p:cNvSpPr>
+          <p:nvPr>
+            <p:ph type="sldNum" sz="quarter" idx="5"/>
+          </p:nvPr>
+        </p:nvSpPr>
+        <p:spPr/>
+        <p:txBody>
+          <a:bodyPr/>
+          <a:lstStyle/>
+          <a:p>
+            <a:fld id="{9CE90544-A233-4575-9A72-45E28C6405FF}" type="slidenum">
+              <a:rPr lang="en-US" smtClean="0"/>
+              <a:t>10</a:t>
+            </a:fld>
+            <a:endParaRPr lang="en-US"/>
+          </a:p>
+        </p:txBody>
+      </p:sp>
+    </p:spTree>
+    <p:extLst>
+      <p:ext uri="{BB962C8B-B14F-4D97-AF65-F5344CB8AC3E}">
+        <p14:creationId xmlns:p14="http://schemas.microsoft.com/office/powerpoint/2010/main" val="2637917426"/>
+      </p:ext>
+    </p:extLst>
+  </p:cSld>
+  <p:clrMapOvr>
+    <a:masterClrMapping/>
+  </p:clrMapOvr>
+</p:notes>
+</file>
+
+<file path=ppt/notesSlides/notesSlide8.xml><?xml version="1.0" encoding="utf-8"?>
+<p:notes xmlns:a="http://schemas.openxmlformats.org/drawingml/2006/main" xmlns:r="http://schemas.openxmlformats.org/officeDocument/2006/relationships" xmlns:p="http://schemas.openxmlformats.org/presentationml/2006/main">
+  <p:cSld>
+    <p:spTree>
+      <p:nvGrpSpPr>
+        <p:cNvPr id="1" name=""/>
+        <p:cNvGrpSpPr/>
+        <p:nvPr/>
+      </p:nvGrpSpPr>
+      <p:grpSpPr>
+        <a:xfrm>
+          <a:off x="0" y="0"/>
+          <a:ext cx="0" cy="0"/>
+          <a:chOff x="0" y="0"/>
+          <a:chExt cx="0" cy="0"/>
+        </a:xfrm>
+      </p:grpSpPr>
+      <p:sp>
+        <p:nvSpPr>
+          <p:cNvPr id="2" name="Slide Image Placeholder 1"/>
+          <p:cNvSpPr>
+            <a:spLocks noGrp="1" noRot="1" noChangeAspect="1"/>
+          </p:cNvSpPr>
+          <p:nvPr>
+            <p:ph type="sldImg"/>
+          </p:nvPr>
+        </p:nvSpPr>
+        <p:spPr/>
+      </p:sp>
+      <p:sp>
+        <p:nvSpPr>
+          <p:cNvPr id="3" name="Notes Placeholder 2"/>
+          <p:cNvSpPr>
+            <a:spLocks noGrp="1"/>
+          </p:cNvSpPr>
+          <p:nvPr>
+            <p:ph type="body" idx="1"/>
+          </p:nvPr>
+        </p:nvSpPr>
+        <p:spPr/>
+        <p:txBody>
+          <a:bodyPr/>
+          <a:lstStyle/>
+          <a:p>
+            <a:r>
+              <a:rPr lang="en-US" dirty="0"/>
+              <a:t>So if we revisit the Base R way of wrangling data…</a:t>
+            </a:r>
+          </a:p>
+        </p:txBody>
+      </p:sp>
+      <p:sp>
+        <p:nvSpPr>
+          <p:cNvPr id="4" name="Slide Number Placeholder 3"/>
+          <p:cNvSpPr>
+            <a:spLocks noGrp="1"/>
+          </p:cNvSpPr>
+          <p:nvPr>
+            <p:ph type="sldNum" sz="quarter" idx="5"/>
+          </p:nvPr>
+        </p:nvSpPr>
+        <p:spPr/>
+        <p:txBody>
+          <a:bodyPr/>
+          <a:lstStyle/>
+          <a:p>
+            <a:fld id="{9CE90544-A233-4575-9A72-45E28C6405FF}" type="slidenum">
+              <a:rPr lang="en-US" smtClean="0"/>
+              <a:t>11</a:t>
+            </a:fld>
+            <a:endParaRPr lang="en-US"/>
+          </a:p>
+        </p:txBody>
+      </p:sp>
+    </p:spTree>
+    <p:extLst>
+      <p:ext uri="{BB962C8B-B14F-4D97-AF65-F5344CB8AC3E}">
+        <p14:creationId xmlns:p14="http://schemas.microsoft.com/office/powerpoint/2010/main" val="3363053719"/>
+      </p:ext>
+    </p:extLst>
+  </p:cSld>
+  <p:clrMapOvr>
+    <a:masterClrMapping/>
+  </p:clrMapOvr>
+</p:notes>
+</file>
+
+<file path=ppt/notesSlides/notesSlide9.xml><?xml version="1.0" encoding="utf-8"?>
+<p:notes xmlns:a="http://schemas.openxmlformats.org/drawingml/2006/main" xmlns:r="http://schemas.openxmlformats.org/officeDocument/2006/relationships" xmlns:p="http://schemas.openxmlformats.org/presentationml/2006/main">
+  <p:cSld>
+    <p:spTree>
+      <p:nvGrpSpPr>
+        <p:cNvPr id="1" name=""/>
+        <p:cNvGrpSpPr/>
+        <p:nvPr/>
+      </p:nvGrpSpPr>
+      <p:grpSpPr>
+        <a:xfrm>
+          <a:off x="0" y="0"/>
+          <a:ext cx="0" cy="0"/>
+          <a:chOff x="0" y="0"/>
+          <a:chExt cx="0" cy="0"/>
+        </a:xfrm>
+      </p:grpSpPr>
+      <p:sp>
+        <p:nvSpPr>
+          <p:cNvPr id="2" name="Slide Image Placeholder 1"/>
+          <p:cNvSpPr>
+            <a:spLocks noGrp="1" noRot="1" noChangeAspect="1"/>
+          </p:cNvSpPr>
+          <p:nvPr>
+            <p:ph type="sldImg"/>
+          </p:nvPr>
+        </p:nvSpPr>
+        <p:spPr/>
+      </p:sp>
+      <p:sp>
+        <p:nvSpPr>
+          <p:cNvPr id="3" name="Notes Placeholder 2"/>
+          <p:cNvSpPr>
+            <a:spLocks noGrp="1"/>
+          </p:cNvSpPr>
+          <p:nvPr>
+            <p:ph type="body" idx="1"/>
+          </p:nvPr>
+        </p:nvSpPr>
+        <p:spPr/>
+        <p:txBody>
+          <a:bodyPr/>
+          <a:lstStyle/>
+          <a:p>
+            <a:r>
+              <a:rPr lang="en-US" dirty="0"/>
+              <a:t>So let’s explicitly talk about what I mean when I say “</a:t>
+            </a:r>
+            <a:r>
+              <a:rPr lang="en-US" dirty="0" err="1"/>
+              <a:t>tidyverse</a:t>
+            </a:r>
+            <a:r>
+              <a:rPr lang="en-US" dirty="0"/>
+              <a:t>”</a:t>
+            </a:r>
+          </a:p>
+        </p:txBody>
+      </p:sp>
+      <p:sp>
+        <p:nvSpPr>
+          <p:cNvPr id="4" name="Slide Number Placeholder 3"/>
+          <p:cNvSpPr>
+            <a:spLocks noGrp="1"/>
+          </p:cNvSpPr>
+          <p:nvPr>
+            <p:ph type="sldNum" sz="quarter" idx="5"/>
+          </p:nvPr>
+        </p:nvSpPr>
+        <p:spPr/>
+        <p:txBody>
+          <a:bodyPr/>
+          <a:lstStyle/>
+          <a:p>
+            <a:fld id="{9CE90544-A233-4575-9A72-45E28C6405FF}" type="slidenum">
+              <a:rPr lang="en-US" smtClean="0"/>
+              <a:t>12</a:t>
+            </a:fld>
+            <a:endParaRPr lang="en-US"/>
+          </a:p>
+        </p:txBody>
+      </p:sp>
+    </p:spTree>
+    <p:extLst>
+      <p:ext uri="{BB962C8B-B14F-4D97-AF65-F5344CB8AC3E}">
+        <p14:creationId xmlns:p14="http://schemas.microsoft.com/office/powerpoint/2010/main" val="1705116811"/>
+      </p:ext>
+    </p:extLst>
+  </p:cSld>
+  <p:clrMapOvr>
+    <a:masterClrMapping/>
+  </p:clrMapOvr>
+</p:notes>
+</file>
+
 <file path=ppt/slideLayouts/slideLayout1.xml><?xml version="1.0" encoding="utf-8"?>
 <p:sldLayout xmlns:a="http://schemas.openxmlformats.org/drawingml/2006/main" xmlns:r="http://schemas.openxmlformats.org/officeDocument/2006/relationships" xmlns:p="http://schemas.openxmlformats.org/presentationml/2006/main" type="title" preserve="1">
   <p:cSld name="Title Slide">
@@ -280,7 +2201,7 @@
           <a:p>
             <a:fld id="{D7A602B9-93E3-411E-84F2-1DED38F1B047}" type="datetimeFigureOut">
               <a:rPr lang="en-US" smtClean="0"/>
-              <a:t>10/26/2023</a:t>
+              <a:t>11/1/2023</a:t>
             </a:fld>
             <a:endParaRPr lang="en-US"/>
           </a:p>
@@ -478,7 +2399,7 @@
           <a:p>
             <a:fld id="{D7A602B9-93E3-411E-84F2-1DED38F1B047}" type="datetimeFigureOut">
               <a:rPr lang="en-US" smtClean="0"/>
-              <a:t>10/26/2023</a:t>
+              <a:t>11/1/2023</a:t>
             </a:fld>
             <a:endParaRPr lang="en-US"/>
           </a:p>
@@ -686,7 +2607,7 @@
           <a:p>
             <a:fld id="{D7A602B9-93E3-411E-84F2-1DED38F1B047}" type="datetimeFigureOut">
               <a:rPr lang="en-US" smtClean="0"/>
-              <a:t>10/26/2023</a:t>
+              <a:t>11/1/2023</a:t>
             </a:fld>
             <a:endParaRPr lang="en-US"/>
           </a:p>
@@ -884,7 +2805,7 @@
           <a:p>
             <a:fld id="{D7A602B9-93E3-411E-84F2-1DED38F1B047}" type="datetimeFigureOut">
               <a:rPr lang="en-US" smtClean="0"/>
-              <a:t>10/26/2023</a:t>
+              <a:t>11/1/2023</a:t>
             </a:fld>
             <a:endParaRPr lang="en-US"/>
           </a:p>
@@ -1159,7 +3080,7 @@
           <a:p>
             <a:fld id="{D7A602B9-93E3-411E-84F2-1DED38F1B047}" type="datetimeFigureOut">
               <a:rPr lang="en-US" smtClean="0"/>
-              <a:t>10/26/2023</a:t>
+              <a:t>11/1/2023</a:t>
             </a:fld>
             <a:endParaRPr lang="en-US"/>
           </a:p>
@@ -1424,7 +3345,7 @@
           <a:p>
             <a:fld id="{D7A602B9-93E3-411E-84F2-1DED38F1B047}" type="datetimeFigureOut">
               <a:rPr lang="en-US" smtClean="0"/>
-              <a:t>10/26/2023</a:t>
+              <a:t>11/1/2023</a:t>
             </a:fld>
             <a:endParaRPr lang="en-US"/>
           </a:p>
@@ -1836,7 +3757,7 @@
           <a:p>
             <a:fld id="{D7A602B9-93E3-411E-84F2-1DED38F1B047}" type="datetimeFigureOut">
               <a:rPr lang="en-US" smtClean="0"/>
-              <a:t>10/26/2023</a:t>
+              <a:t>11/1/2023</a:t>
             </a:fld>
             <a:endParaRPr lang="en-US"/>
           </a:p>
@@ -1977,7 +3898,7 @@
           <a:p>
             <a:fld id="{D7A602B9-93E3-411E-84F2-1DED38F1B047}" type="datetimeFigureOut">
               <a:rPr lang="en-US" smtClean="0"/>
-              <a:t>10/26/2023</a:t>
+              <a:t>11/1/2023</a:t>
             </a:fld>
             <a:endParaRPr lang="en-US"/>
           </a:p>
@@ -2090,7 +4011,7 @@
           <a:p>
             <a:fld id="{D7A602B9-93E3-411E-84F2-1DED38F1B047}" type="datetimeFigureOut">
               <a:rPr lang="en-US" smtClean="0"/>
-              <a:t>10/26/2023</a:t>
+              <a:t>11/1/2023</a:t>
             </a:fld>
             <a:endParaRPr lang="en-US"/>
           </a:p>
@@ -2401,7 +4322,7 @@
           <a:p>
             <a:fld id="{D7A602B9-93E3-411E-84F2-1DED38F1B047}" type="datetimeFigureOut">
               <a:rPr lang="en-US" smtClean="0"/>
-              <a:t>10/26/2023</a:t>
+              <a:t>11/1/2023</a:t>
             </a:fld>
             <a:endParaRPr lang="en-US"/>
           </a:p>
@@ -2689,7 +4610,7 @@
           <a:p>
             <a:fld id="{D7A602B9-93E3-411E-84F2-1DED38F1B047}" type="datetimeFigureOut">
               <a:rPr lang="en-US" smtClean="0"/>
-              <a:t>10/26/2023</a:t>
+              <a:t>11/1/2023</a:t>
             </a:fld>
             <a:endParaRPr lang="en-US"/>
           </a:p>
@@ -2930,7 +4851,7 @@
           <a:p>
             <a:fld id="{D7A602B9-93E3-411E-84F2-1DED38F1B047}" type="datetimeFigureOut">
               <a:rPr lang="en-US" smtClean="0"/>
-              <a:t>10/26/2023</a:t>
+              <a:t>11/1/2023</a:t>
             </a:fld>
             <a:endParaRPr lang="en-US"/>
           </a:p>
@@ -3469,8 +5390,17 @@
             </a:r>
             <a:r>
               <a:rPr lang="en-US" sz="3600" dirty="0"/>
-              <a:t> package</a:t>
-            </a:r>
+              <a:t> package (part of </a:t>
+            </a:r>
+            <a:r>
+              <a:rPr lang="en-US" sz="3600" dirty="0" err="1"/>
+              <a:t>tidyverse</a:t>
+            </a:r>
+            <a:r>
+              <a:rPr lang="en-US" sz="3600"/>
+              <a:t>)</a:t>
+            </a:r>
+            <a:endParaRPr lang="en-US" sz="3600" dirty="0"/>
           </a:p>
         </p:txBody>
       </p:sp>
@@ -3864,7 +5794,15 @@
           <a:p>
             <a:r>
               <a:rPr lang="en-US" dirty="0"/>
-              <a:t>Provides a set of functions (“verbs”) for typical data operations</a:t>
+              <a:t>Provides a set of functions (“verbs”) for </a:t>
+            </a:r>
+            <a:r>
+              <a:rPr lang="en-US" i="1" dirty="0"/>
+              <a:t>typical</a:t>
+            </a:r>
+            <a:r>
+              <a:rPr lang="en-US" dirty="0"/>
+              <a:t> data operations</a:t>
             </a:r>
           </a:p>
           <a:p>
@@ -4171,7 +6109,7 @@
           <p:nvPr/>
         </p:nvPicPr>
         <p:blipFill rotWithShape="1">
-          <a:blip r:embed="rId2"/>
+          <a:blip r:embed="rId3"/>
           <a:srcRect t="34603"/>
           <a:stretch/>
         </p:blipFill>
@@ -4617,7 +6555,7 @@
           <p:nvPr/>
         </p:nvPicPr>
         <p:blipFill>
-          <a:blip r:embed="rId2"/>
+          <a:blip r:embed="rId3"/>
           <a:stretch>
             <a:fillRect/>
           </a:stretch>
@@ -4647,7 +6585,7 @@
           <p:nvPr/>
         </p:nvPicPr>
         <p:blipFill>
-          <a:blip r:embed="rId2"/>
+          <a:blip r:embed="rId3"/>
           <a:stretch>
             <a:fillRect/>
           </a:stretch>
@@ -4677,7 +6615,7 @@
           <p:nvPr/>
         </p:nvPicPr>
         <p:blipFill>
-          <a:blip r:embed="rId2"/>
+          <a:blip r:embed="rId3"/>
           <a:stretch>
             <a:fillRect/>
           </a:stretch>
@@ -4707,7 +6645,7 @@
           <p:nvPr/>
         </p:nvPicPr>
         <p:blipFill>
-          <a:blip r:embed="rId2"/>
+          <a:blip r:embed="rId3"/>
           <a:stretch>
             <a:fillRect/>
           </a:stretch>
@@ -4737,7 +6675,7 @@
           <p:nvPr/>
         </p:nvPicPr>
         <p:blipFill rotWithShape="1">
-          <a:blip r:embed="rId3">
+          <a:blip r:embed="rId4">
             <a:extLst>
               <a:ext uri="{28A0092B-C50C-407E-A947-70E740481C1C}">
                 <a14:useLocalDpi xmlns:a14="http://schemas.microsoft.com/office/drawing/2010/main" val="0"/>
@@ -4772,7 +6710,7 @@
           <p:nvPr/>
         </p:nvPicPr>
         <p:blipFill rotWithShape="1">
-          <a:blip r:embed="rId3">
+          <a:blip r:embed="rId4">
             <a:extLst>
               <a:ext uri="{28A0092B-C50C-407E-A947-70E740481C1C}">
                 <a14:useLocalDpi xmlns:a14="http://schemas.microsoft.com/office/drawing/2010/main" val="0"/>
@@ -4807,7 +6745,7 @@
           <p:nvPr/>
         </p:nvPicPr>
         <p:blipFill rotWithShape="1">
-          <a:blip r:embed="rId3">
+          <a:blip r:embed="rId4">
             <a:extLst>
               <a:ext uri="{28A0092B-C50C-407E-A947-70E740481C1C}">
                 <a14:useLocalDpi xmlns:a14="http://schemas.microsoft.com/office/drawing/2010/main" val="0"/>
@@ -4842,7 +6780,7 @@
           <p:nvPr/>
         </p:nvPicPr>
         <p:blipFill rotWithShape="1">
-          <a:blip r:embed="rId3">
+          <a:blip r:embed="rId4">
             <a:extLst>
               <a:ext uri="{28A0092B-C50C-407E-A947-70E740481C1C}">
                 <a14:useLocalDpi xmlns:a14="http://schemas.microsoft.com/office/drawing/2010/main" val="0"/>
@@ -7535,7 +9473,7 @@
           <p:nvPr/>
         </p:nvPicPr>
         <p:blipFill>
-          <a:blip r:embed="rId2"/>
+          <a:blip r:embed="rId3"/>
           <a:stretch>
             <a:fillRect/>
           </a:stretch>
@@ -9964,14 +11902,14 @@
             </a:pPr>
             <a:r>
               <a:rPr lang="en-US" sz="2000" dirty="0"/>
-              <a:t>catchdata[ , names(catchdata) %in% c("station", "catch")]</a:t>
+              <a:t>catchdata[ , c("station", "catch")]</a:t>
             </a:r>
           </a:p>
           <a:p>
             <a:pPr lvl="1"/>
             <a:r>
               <a:rPr lang="en-US" sz="1800" dirty="0"/>
-              <a:t>Messy!</a:t>
+              <a:t>Kinda messy!</a:t>
             </a:r>
           </a:p>
         </p:txBody>
@@ -15309,7 +17247,7 @@
             </a:r>
             <a:r>
               <a:rPr lang="en-US" sz="2000" dirty="0"/>
-              <a:t>==“sun”] &lt;- “SUN!”</a:t>
+              <a:t>=="sun"] &lt;- "SUN!"</a:t>
             </a:r>
           </a:p>
           <a:p>
@@ -16089,6 +18027,256 @@
           </a:p>
         </p:txBody>
       </p:sp>
+      <p:sp>
+        <p:nvSpPr>
+          <p:cNvPr id="13" name="Content Placeholder 2">
+            <a:extLst>
+              <a:ext uri="{FF2B5EF4-FFF2-40B4-BE49-F238E27FC236}">
+                <a16:creationId xmlns:a16="http://schemas.microsoft.com/office/drawing/2014/main" id="{1669E9CB-510E-021C-F1DD-D2A2B75596AD}"/>
+              </a:ext>
+            </a:extLst>
+          </p:cNvPr>
+          <p:cNvSpPr txBox="1">
+            <a:spLocks/>
+          </p:cNvSpPr>
+          <p:nvPr/>
+        </p:nvSpPr>
+        <p:spPr>
+          <a:xfrm>
+            <a:off x="7831871" y="3509835"/>
+            <a:ext cx="1563079" cy="672509"/>
+          </a:xfrm>
+          <a:prstGeom prst="rect">
+            <a:avLst/>
+          </a:prstGeom>
+          <a:ln>
+            <a:solidFill>
+              <a:schemeClr val="bg1"/>
+            </a:solidFill>
+          </a:ln>
+        </p:spPr>
+        <p:txBody>
+          <a:bodyPr vert="horz" lIns="91440" tIns="45720" rIns="91440" bIns="45720" rtlCol="0">
+            <a:normAutofit fontScale="92500"/>
+          </a:bodyPr>
+          <a:lstStyle>
+            <a:lvl1pPr marL="228600" indent="-228600" algn="l" defTabSz="914400" rtl="0" eaLnBrk="1" latinLnBrk="0" hangingPunct="1">
+              <a:lnSpc>
+                <a:spcPct val="90000"/>
+              </a:lnSpc>
+              <a:spcBef>
+                <a:spcPts val="1000"/>
+              </a:spcBef>
+              <a:buFont typeface="Arial" panose="020B0604020202020204" pitchFamily="34" charset="0"/>
+              <a:buChar char="•"/>
+              <a:defRPr sz="2800" kern="1200">
+                <a:solidFill>
+                  <a:schemeClr val="tx1"/>
+                </a:solidFill>
+                <a:latin typeface="+mn-lt"/>
+                <a:ea typeface="+mn-ea"/>
+                <a:cs typeface="+mn-cs"/>
+              </a:defRPr>
+            </a:lvl1pPr>
+            <a:lvl2pPr marL="685800" indent="-228600" algn="l" defTabSz="914400" rtl="0" eaLnBrk="1" latinLnBrk="0" hangingPunct="1">
+              <a:lnSpc>
+                <a:spcPct val="90000"/>
+              </a:lnSpc>
+              <a:spcBef>
+                <a:spcPts val="500"/>
+              </a:spcBef>
+              <a:buFont typeface="Arial" panose="020B0604020202020204" pitchFamily="34" charset="0"/>
+              <a:buChar char="•"/>
+              <a:defRPr sz="2400" kern="1200">
+                <a:solidFill>
+                  <a:schemeClr val="tx1"/>
+                </a:solidFill>
+                <a:latin typeface="+mn-lt"/>
+                <a:ea typeface="+mn-ea"/>
+                <a:cs typeface="+mn-cs"/>
+              </a:defRPr>
+            </a:lvl2pPr>
+            <a:lvl3pPr marL="1143000" indent="-228600" algn="l" defTabSz="914400" rtl="0" eaLnBrk="1" latinLnBrk="0" hangingPunct="1">
+              <a:lnSpc>
+                <a:spcPct val="90000"/>
+              </a:lnSpc>
+              <a:spcBef>
+                <a:spcPts val="500"/>
+              </a:spcBef>
+              <a:buFont typeface="Arial" panose="020B0604020202020204" pitchFamily="34" charset="0"/>
+              <a:buChar char="•"/>
+              <a:defRPr sz="2000" kern="1200">
+                <a:solidFill>
+                  <a:schemeClr val="tx1"/>
+                </a:solidFill>
+                <a:latin typeface="+mn-lt"/>
+                <a:ea typeface="+mn-ea"/>
+                <a:cs typeface="+mn-cs"/>
+              </a:defRPr>
+            </a:lvl3pPr>
+            <a:lvl4pPr marL="1600200" indent="-228600" algn="l" defTabSz="914400" rtl="0" eaLnBrk="1" latinLnBrk="0" hangingPunct="1">
+              <a:lnSpc>
+                <a:spcPct val="90000"/>
+              </a:lnSpc>
+              <a:spcBef>
+                <a:spcPts val="500"/>
+              </a:spcBef>
+              <a:buFont typeface="Arial" panose="020B0604020202020204" pitchFamily="34" charset="0"/>
+              <a:buChar char="•"/>
+              <a:defRPr sz="1800" kern="1200">
+                <a:solidFill>
+                  <a:schemeClr val="tx1"/>
+                </a:solidFill>
+                <a:latin typeface="+mn-lt"/>
+                <a:ea typeface="+mn-ea"/>
+                <a:cs typeface="+mn-cs"/>
+              </a:defRPr>
+            </a:lvl4pPr>
+            <a:lvl5pPr marL="2057400" indent="-228600" algn="l" defTabSz="914400" rtl="0" eaLnBrk="1" latinLnBrk="0" hangingPunct="1">
+              <a:lnSpc>
+                <a:spcPct val="90000"/>
+              </a:lnSpc>
+              <a:spcBef>
+                <a:spcPts val="500"/>
+              </a:spcBef>
+              <a:buFont typeface="Arial" panose="020B0604020202020204" pitchFamily="34" charset="0"/>
+              <a:buChar char="•"/>
+              <a:defRPr sz="1800" kern="1200">
+                <a:solidFill>
+                  <a:schemeClr val="tx1"/>
+                </a:solidFill>
+                <a:latin typeface="+mn-lt"/>
+                <a:ea typeface="+mn-ea"/>
+                <a:cs typeface="+mn-cs"/>
+              </a:defRPr>
+            </a:lvl5pPr>
+            <a:lvl6pPr marL="2514600" indent="-228600" algn="l" defTabSz="914400" rtl="0" eaLnBrk="1" latinLnBrk="0" hangingPunct="1">
+              <a:lnSpc>
+                <a:spcPct val="90000"/>
+              </a:lnSpc>
+              <a:spcBef>
+                <a:spcPts val="500"/>
+              </a:spcBef>
+              <a:buFont typeface="Arial" panose="020B0604020202020204" pitchFamily="34" charset="0"/>
+              <a:buChar char="•"/>
+              <a:defRPr sz="1800" kern="1200">
+                <a:solidFill>
+                  <a:schemeClr val="tx1"/>
+                </a:solidFill>
+                <a:latin typeface="+mn-lt"/>
+                <a:ea typeface="+mn-ea"/>
+                <a:cs typeface="+mn-cs"/>
+              </a:defRPr>
+            </a:lvl6pPr>
+            <a:lvl7pPr marL="2971800" indent="-228600" algn="l" defTabSz="914400" rtl="0" eaLnBrk="1" latinLnBrk="0" hangingPunct="1">
+              <a:lnSpc>
+                <a:spcPct val="90000"/>
+              </a:lnSpc>
+              <a:spcBef>
+                <a:spcPts val="500"/>
+              </a:spcBef>
+              <a:buFont typeface="Arial" panose="020B0604020202020204" pitchFamily="34" charset="0"/>
+              <a:buChar char="•"/>
+              <a:defRPr sz="1800" kern="1200">
+                <a:solidFill>
+                  <a:schemeClr val="tx1"/>
+                </a:solidFill>
+                <a:latin typeface="+mn-lt"/>
+                <a:ea typeface="+mn-ea"/>
+                <a:cs typeface="+mn-cs"/>
+              </a:defRPr>
+            </a:lvl7pPr>
+            <a:lvl8pPr marL="3429000" indent="-228600" algn="l" defTabSz="914400" rtl="0" eaLnBrk="1" latinLnBrk="0" hangingPunct="1">
+              <a:lnSpc>
+                <a:spcPct val="90000"/>
+              </a:lnSpc>
+              <a:spcBef>
+                <a:spcPts val="500"/>
+              </a:spcBef>
+              <a:buFont typeface="Arial" panose="020B0604020202020204" pitchFamily="34" charset="0"/>
+              <a:buChar char="•"/>
+              <a:defRPr sz="1800" kern="1200">
+                <a:solidFill>
+                  <a:schemeClr val="tx1"/>
+                </a:solidFill>
+                <a:latin typeface="+mn-lt"/>
+                <a:ea typeface="+mn-ea"/>
+                <a:cs typeface="+mn-cs"/>
+              </a:defRPr>
+            </a:lvl8pPr>
+            <a:lvl9pPr marL="3886200" indent="-228600" algn="l" defTabSz="914400" rtl="0" eaLnBrk="1" latinLnBrk="0" hangingPunct="1">
+              <a:lnSpc>
+                <a:spcPct val="90000"/>
+              </a:lnSpc>
+              <a:spcBef>
+                <a:spcPts val="500"/>
+              </a:spcBef>
+              <a:buFont typeface="Arial" panose="020B0604020202020204" pitchFamily="34" charset="0"/>
+              <a:buChar char="•"/>
+              <a:defRPr sz="1800" kern="1200">
+                <a:solidFill>
+                  <a:schemeClr val="tx1"/>
+                </a:solidFill>
+                <a:latin typeface="+mn-lt"/>
+                <a:ea typeface="+mn-ea"/>
+                <a:cs typeface="+mn-cs"/>
+              </a:defRPr>
+            </a:lvl9pPr>
+          </a:lstStyle>
+          <a:p>
+            <a:pPr marL="0" indent="0">
+              <a:buFont typeface="Arial" panose="020B0604020202020204" pitchFamily="34" charset="0"/>
+              <a:buNone/>
+            </a:pPr>
+            <a:r>
+              <a:rPr lang="en-US" sz="2000" dirty="0"/>
+              <a:t>Note that this is a vector!</a:t>
+            </a:r>
+            <a:endParaRPr lang="en-US" sz="1800" dirty="0"/>
+          </a:p>
+        </p:txBody>
+      </p:sp>
+      <p:cxnSp>
+        <p:nvCxnSpPr>
+          <p:cNvPr id="15" name="Straight Arrow Connector 14">
+            <a:extLst>
+              <a:ext uri="{FF2B5EF4-FFF2-40B4-BE49-F238E27FC236}">
+                <a16:creationId xmlns:a16="http://schemas.microsoft.com/office/drawing/2014/main" id="{4ADCAB62-18BD-9673-7CC2-04D0D0AF8066}"/>
+              </a:ext>
+            </a:extLst>
+          </p:cNvPr>
+          <p:cNvCxnSpPr>
+            <a:cxnSpLocks/>
+          </p:cNvCxnSpPr>
+          <p:nvPr/>
+        </p:nvCxnSpPr>
+        <p:spPr>
+          <a:xfrm flipH="1" flipV="1">
+            <a:off x="8099715" y="3239598"/>
+            <a:ext cx="259747" cy="238329"/>
+          </a:xfrm>
+          <a:prstGeom prst="straightConnector1">
+            <a:avLst/>
+          </a:prstGeom>
+          <a:ln>
+            <a:tailEnd type="triangle"/>
+          </a:ln>
+        </p:spPr>
+        <p:style>
+          <a:lnRef idx="1">
+            <a:schemeClr val="accent1"/>
+          </a:lnRef>
+          <a:fillRef idx="0">
+            <a:schemeClr val="accent1"/>
+          </a:fillRef>
+          <a:effectRef idx="0">
+            <a:schemeClr val="accent1"/>
+          </a:effectRef>
+          <a:fontRef idx="minor">
+            <a:schemeClr val="tx1"/>
+          </a:fontRef>
+        </p:style>
+      </p:cxnSp>
     </p:spTree>
     <p:extLst>
       <p:ext uri="{BB962C8B-B14F-4D97-AF65-F5344CB8AC3E}">
@@ -16394,6 +18582,78 @@
                                           </p:stCondLst>
                                         </p:cTn>
                                         <p:tgtEl>
+                                          <p:spTgt spid="13"/>
+                                        </p:tgtEl>
+                                        <p:attrNameLst>
+                                          <p:attrName>style.visibility</p:attrName>
+                                        </p:attrNameLst>
+                                      </p:cBhvr>
+                                      <p:to>
+                                        <p:strVal val="visible"/>
+                                      </p:to>
+                                    </p:set>
+                                  </p:childTnLst>
+                                </p:cTn>
+                              </p:par>
+                              <p:par>
+                                <p:cTn id="29" presetID="1" presetClass="entr" presetSubtype="0" fill="hold" nodeType="withEffect">
+                                  <p:stCondLst>
+                                    <p:cond delay="0"/>
+                                  </p:stCondLst>
+                                  <p:childTnLst>
+                                    <p:set>
+                                      <p:cBhvr>
+                                        <p:cTn id="30" dur="1" fill="hold">
+                                          <p:stCondLst>
+                                            <p:cond delay="0"/>
+                                          </p:stCondLst>
+                                        </p:cTn>
+                                        <p:tgtEl>
+                                          <p:spTgt spid="15"/>
+                                        </p:tgtEl>
+                                        <p:attrNameLst>
+                                          <p:attrName>style.visibility</p:attrName>
+                                        </p:attrNameLst>
+                                      </p:cBhvr>
+                                      <p:to>
+                                        <p:strVal val="visible"/>
+                                      </p:to>
+                                    </p:set>
+                                  </p:childTnLst>
+                                </p:cTn>
+                              </p:par>
+                            </p:childTnLst>
+                          </p:cTn>
+                        </p:par>
+                      </p:childTnLst>
+                    </p:cTn>
+                  </p:par>
+                  <p:par>
+                    <p:cTn id="31" fill="hold">
+                      <p:stCondLst>
+                        <p:cond delay="indefinite"/>
+                      </p:stCondLst>
+                      <p:childTnLst>
+                        <p:par>
+                          <p:cTn id="32" fill="hold">
+                            <p:stCondLst>
+                              <p:cond delay="0"/>
+                            </p:stCondLst>
+                            <p:childTnLst>
+                              <p:par>
+                                <p:cTn id="33" presetID="1" presetClass="entr" presetSubtype="0" fill="hold" grpId="0" nodeType="clickEffect">
+                                  <p:stCondLst>
+                                    <p:cond delay="0"/>
+                                  </p:stCondLst>
+                                  <p:childTnLst>
+                                    <p:set>
+                                      <p:cBhvr>
+                                        <p:cTn id="34" dur="1" fill="hold">
+                                          <p:stCondLst>
+                                            <p:cond delay="0"/>
+                                          </p:stCondLst>
+                                        </p:cTn>
+                                        <p:tgtEl>
                                           <p:spTgt spid="5"/>
                                         </p:tgtEl>
                                         <p:attrNameLst>
@@ -16443,6 +18703,7 @@
       <p:bldP spid="10" grpId="0" animBg="1"/>
       <p:bldP spid="11" grpId="0" animBg="1"/>
       <p:bldP spid="12" grpId="0" animBg="1"/>
+      <p:bldP spid="13" grpId="0" animBg="1"/>
     </p:bldLst>
   </p:timing>
 </p:sld>
@@ -20186,7 +22447,7 @@
           <p:nvPr/>
         </p:nvPicPr>
         <p:blipFill>
-          <a:blip r:embed="rId2">
+          <a:blip r:embed="rId3">
             <a:extLst>
               <a:ext uri="{28A0092B-C50C-407E-A947-70E740481C1C}">
                 <a14:useLocalDpi xmlns:a14="http://schemas.microsoft.com/office/drawing/2010/main" val="0"/>
@@ -20298,7 +22559,7 @@
           <a:p>
             <a:r>
               <a:rPr lang="en-US" dirty="0">
-                <a:hlinkClick r:id="rId2"/>
+                <a:hlinkClick r:id="rId3"/>
               </a:rPr>
               <a:t>https://cran.r-project.org/web/packages/dplyr/vignettes/dplyr.html</a:t>
             </a:r>
@@ -20307,7 +22568,7 @@
           <a:p>
             <a:r>
               <a:rPr lang="en-US" dirty="0">
-                <a:hlinkClick r:id="rId3"/>
+                <a:hlinkClick r:id="rId4"/>
               </a:rPr>
               <a:t>https://www.tidyverse.org/</a:t>
             </a:r>
@@ -20333,7 +22594,7 @@
           <p:nvPr/>
         </p:nvPicPr>
         <p:blipFill>
-          <a:blip r:embed="rId4"/>
+          <a:blip r:embed="rId5"/>
           <a:stretch>
             <a:fillRect/>
           </a:stretch>
@@ -20363,7 +22624,7 @@
           <p:nvPr/>
         </p:nvPicPr>
         <p:blipFill>
-          <a:blip r:embed="rId5"/>
+          <a:blip r:embed="rId6"/>
           <a:stretch>
             <a:fillRect/>
           </a:stretch>
@@ -20392,6 +22653,1184 @@
 </file>
 
 <file path=ppt/slides/slide21.xml><?xml version="1.0" encoding="utf-8"?>
+<p:sld xmlns:a="http://schemas.openxmlformats.org/drawingml/2006/main" xmlns:r="http://schemas.openxmlformats.org/officeDocument/2006/relationships" xmlns:p="http://schemas.openxmlformats.org/presentationml/2006/main">
+  <p:cSld>
+    <p:spTree>
+      <p:nvGrpSpPr>
+        <p:cNvPr id="1" name=""/>
+        <p:cNvGrpSpPr/>
+        <p:nvPr/>
+      </p:nvGrpSpPr>
+      <p:grpSpPr>
+        <a:xfrm>
+          <a:off x="0" y="0"/>
+          <a:ext cx="0" cy="0"/>
+          <a:chOff x="0" y="0"/>
+          <a:chExt cx="0" cy="0"/>
+        </a:xfrm>
+      </p:grpSpPr>
+      <p:sp>
+        <p:nvSpPr>
+          <p:cNvPr id="2" name="Title 1">
+            <a:extLst>
+              <a:ext uri="{FF2B5EF4-FFF2-40B4-BE49-F238E27FC236}">
+                <a16:creationId xmlns:a16="http://schemas.microsoft.com/office/drawing/2014/main" id="{8115451F-211E-5062-3063-EEFCC622ABEA}"/>
+              </a:ext>
+            </a:extLst>
+          </p:cNvPr>
+          <p:cNvSpPr>
+            <a:spLocks noGrp="1"/>
+          </p:cNvSpPr>
+          <p:nvPr>
+            <p:ph type="title"/>
+          </p:nvPr>
+        </p:nvSpPr>
+        <p:spPr>
+          <a:xfrm>
+            <a:off x="3910040" y="0"/>
+            <a:ext cx="4371920" cy="914400"/>
+          </a:xfrm>
+        </p:spPr>
+        <p:txBody>
+          <a:bodyPr>
+            <a:noAutofit/>
+          </a:bodyPr>
+          <a:lstStyle/>
+          <a:p>
+            <a:r>
+              <a:rPr lang="en-US" sz="3600" dirty="0"/>
+              <a:t>Which to use?  Why??</a:t>
+            </a:r>
+          </a:p>
+        </p:txBody>
+      </p:sp>
+      <p:pic>
+        <p:nvPicPr>
+          <p:cNvPr id="6" name="Picture 5" descr="A picture containing text, person, human face, person&#10;&#10;Description automatically generated">
+            <a:extLst>
+              <a:ext uri="{FF2B5EF4-FFF2-40B4-BE49-F238E27FC236}">
+                <a16:creationId xmlns:a16="http://schemas.microsoft.com/office/drawing/2014/main" id="{1BE062A5-1BB4-259F-AE5C-84D43780BDA2}"/>
+              </a:ext>
+            </a:extLst>
+          </p:cNvPr>
+          <p:cNvPicPr>
+            <a:picLocks noChangeAspect="1"/>
+          </p:cNvPicPr>
+          <p:nvPr/>
+        </p:nvPicPr>
+        <p:blipFill>
+          <a:blip r:embed="rId3">
+            <a:extLst>
+              <a:ext uri="{28A0092B-C50C-407E-A947-70E740481C1C}">
+                <a14:useLocalDpi xmlns:a14="http://schemas.microsoft.com/office/drawing/2010/main" val="0"/>
+              </a:ext>
+            </a:extLst>
+          </a:blip>
+          <a:stretch>
+            <a:fillRect/>
+          </a:stretch>
+        </p:blipFill>
+        <p:spPr>
+          <a:xfrm>
+            <a:off x="4648961" y="914400"/>
+            <a:ext cx="2724150" cy="1676400"/>
+          </a:xfrm>
+          <a:prstGeom prst="rect">
+            <a:avLst/>
+          </a:prstGeom>
+        </p:spPr>
+      </p:pic>
+      <p:sp>
+        <p:nvSpPr>
+          <p:cNvPr id="3" name="Content Placeholder 2">
+            <a:extLst>
+              <a:ext uri="{FF2B5EF4-FFF2-40B4-BE49-F238E27FC236}">
+                <a16:creationId xmlns:a16="http://schemas.microsoft.com/office/drawing/2014/main" id="{9378224E-423F-E8A2-8DBE-6D230C57DC06}"/>
+              </a:ext>
+            </a:extLst>
+          </p:cNvPr>
+          <p:cNvSpPr>
+            <a:spLocks noGrp="1"/>
+          </p:cNvSpPr>
+          <p:nvPr>
+            <p:ph idx="1"/>
+          </p:nvPr>
+        </p:nvSpPr>
+        <p:spPr>
+          <a:xfrm>
+            <a:off x="431800" y="3183466"/>
+            <a:ext cx="10929577" cy="3318934"/>
+          </a:xfrm>
+        </p:spPr>
+        <p:txBody>
+          <a:bodyPr>
+            <a:normAutofit/>
+          </a:bodyPr>
+          <a:lstStyle/>
+          <a:p>
+            <a:pPr algn="ctr"/>
+            <a:r>
+              <a:rPr lang="en-US" dirty="0" err="1"/>
+              <a:t>Tidyverse</a:t>
+            </a:r>
+            <a:r>
+              <a:rPr lang="en-US" dirty="0"/>
+              <a:t> requires learning a new syntax</a:t>
+            </a:r>
+          </a:p>
+          <a:p>
+            <a:pPr algn="ctr"/>
+            <a:r>
+              <a:rPr lang="en-US" dirty="0"/>
+              <a:t>But </a:t>
+            </a:r>
+            <a:r>
+              <a:rPr lang="en-US" dirty="0" err="1"/>
+              <a:t>Tidyverse’s</a:t>
+            </a:r>
+            <a:r>
+              <a:rPr lang="en-US" dirty="0"/>
+              <a:t> syntax is much more concise and readable</a:t>
+            </a:r>
+          </a:p>
+          <a:p>
+            <a:pPr algn="ctr"/>
+            <a:r>
+              <a:rPr lang="en-US" dirty="0"/>
+              <a:t>More documentation is available for Base R</a:t>
+            </a:r>
+          </a:p>
+          <a:p>
+            <a:pPr algn="ctr"/>
+            <a:r>
+              <a:rPr lang="en-US" dirty="0"/>
+              <a:t>But </a:t>
+            </a:r>
+            <a:r>
+              <a:rPr lang="en-US" dirty="0" err="1"/>
+              <a:t>Tidyverse</a:t>
+            </a:r>
+            <a:r>
+              <a:rPr lang="en-US" dirty="0"/>
+              <a:t> is quickly gaining popularity and becoming standard</a:t>
+            </a:r>
+          </a:p>
+          <a:p>
+            <a:pPr algn="ctr"/>
+            <a:r>
+              <a:rPr lang="en-US" dirty="0"/>
+              <a:t>Base R is more static &amp; stable</a:t>
+            </a:r>
+          </a:p>
+          <a:p>
+            <a:pPr algn="ctr"/>
+            <a:r>
+              <a:rPr lang="en-US" dirty="0"/>
+              <a:t>The power of the pipe!!!</a:t>
+            </a:r>
+          </a:p>
+          <a:p>
+            <a:pPr algn="ctr"/>
+            <a:endParaRPr lang="en-US" dirty="0"/>
+          </a:p>
+        </p:txBody>
+      </p:sp>
+      <p:sp>
+        <p:nvSpPr>
+          <p:cNvPr id="4" name="Smiley Face 3">
+            <a:extLst>
+              <a:ext uri="{FF2B5EF4-FFF2-40B4-BE49-F238E27FC236}">
+                <a16:creationId xmlns:a16="http://schemas.microsoft.com/office/drawing/2014/main" id="{76942E0C-F894-1BB8-66EB-061E9D60C8E8}"/>
+              </a:ext>
+            </a:extLst>
+          </p:cNvPr>
+          <p:cNvSpPr/>
+          <p:nvPr/>
+        </p:nvSpPr>
+        <p:spPr>
+          <a:xfrm>
+            <a:off x="11164618" y="3243105"/>
+            <a:ext cx="393518" cy="371789"/>
+          </a:xfrm>
+          <a:prstGeom prst="smileyFace">
+            <a:avLst/>
+          </a:prstGeom>
+          <a:solidFill>
+            <a:srgbClr val="FFFF00"/>
+          </a:solidFill>
+          <a:ln w="31750">
+            <a:solidFill>
+              <a:schemeClr val="tx1"/>
+            </a:solidFill>
+          </a:ln>
+        </p:spPr>
+        <p:style>
+          <a:lnRef idx="2">
+            <a:schemeClr val="accent1">
+              <a:shade val="50000"/>
+            </a:schemeClr>
+          </a:lnRef>
+          <a:fillRef idx="1">
+            <a:schemeClr val="accent1"/>
+          </a:fillRef>
+          <a:effectRef idx="0">
+            <a:schemeClr val="accent1"/>
+          </a:effectRef>
+          <a:fontRef idx="minor">
+            <a:schemeClr val="lt1"/>
+          </a:fontRef>
+        </p:style>
+        <p:txBody>
+          <a:bodyPr rtlCol="0" anchor="ctr"/>
+          <a:lstStyle/>
+          <a:p>
+            <a:pPr algn="ctr"/>
+            <a:endParaRPr lang="en-US"/>
+          </a:p>
+        </p:txBody>
+      </p:sp>
+      <p:sp>
+        <p:nvSpPr>
+          <p:cNvPr id="5" name="Smiley Face 4">
+            <a:extLst>
+              <a:ext uri="{FF2B5EF4-FFF2-40B4-BE49-F238E27FC236}">
+                <a16:creationId xmlns:a16="http://schemas.microsoft.com/office/drawing/2014/main" id="{6F0CDD49-CC1F-E7C0-D43F-1FE8B9F4F873}"/>
+              </a:ext>
+            </a:extLst>
+          </p:cNvPr>
+          <p:cNvSpPr/>
+          <p:nvPr/>
+        </p:nvSpPr>
+        <p:spPr>
+          <a:xfrm>
+            <a:off x="431800" y="3714001"/>
+            <a:ext cx="393518" cy="371789"/>
+          </a:xfrm>
+          <a:prstGeom prst="smileyFace">
+            <a:avLst/>
+          </a:prstGeom>
+          <a:solidFill>
+            <a:srgbClr val="FFFF00"/>
+          </a:solidFill>
+          <a:ln w="31750">
+            <a:solidFill>
+              <a:schemeClr val="tx1"/>
+            </a:solidFill>
+          </a:ln>
+        </p:spPr>
+        <p:style>
+          <a:lnRef idx="2">
+            <a:schemeClr val="accent1">
+              <a:shade val="50000"/>
+            </a:schemeClr>
+          </a:lnRef>
+          <a:fillRef idx="1">
+            <a:schemeClr val="accent1"/>
+          </a:fillRef>
+          <a:effectRef idx="0">
+            <a:schemeClr val="accent1"/>
+          </a:effectRef>
+          <a:fontRef idx="minor">
+            <a:schemeClr val="lt1"/>
+          </a:fontRef>
+        </p:style>
+        <p:txBody>
+          <a:bodyPr rtlCol="0" anchor="ctr"/>
+          <a:lstStyle/>
+          <a:p>
+            <a:pPr algn="ctr"/>
+            <a:endParaRPr lang="en-US"/>
+          </a:p>
+        </p:txBody>
+      </p:sp>
+      <p:sp>
+        <p:nvSpPr>
+          <p:cNvPr id="7" name="Smiley Face 6">
+            <a:extLst>
+              <a:ext uri="{FF2B5EF4-FFF2-40B4-BE49-F238E27FC236}">
+                <a16:creationId xmlns:a16="http://schemas.microsoft.com/office/drawing/2014/main" id="{7DD10463-6831-4D23-ADD5-81D7BDFD7A3C}"/>
+              </a:ext>
+            </a:extLst>
+          </p:cNvPr>
+          <p:cNvSpPr/>
+          <p:nvPr/>
+        </p:nvSpPr>
+        <p:spPr>
+          <a:xfrm>
+            <a:off x="11164618" y="4207560"/>
+            <a:ext cx="393518" cy="371789"/>
+          </a:xfrm>
+          <a:prstGeom prst="smileyFace">
+            <a:avLst/>
+          </a:prstGeom>
+          <a:solidFill>
+            <a:srgbClr val="FFFF00"/>
+          </a:solidFill>
+          <a:ln w="31750">
+            <a:solidFill>
+              <a:schemeClr val="tx1"/>
+            </a:solidFill>
+          </a:ln>
+        </p:spPr>
+        <p:style>
+          <a:lnRef idx="2">
+            <a:schemeClr val="accent1">
+              <a:shade val="50000"/>
+            </a:schemeClr>
+          </a:lnRef>
+          <a:fillRef idx="1">
+            <a:schemeClr val="accent1"/>
+          </a:fillRef>
+          <a:effectRef idx="0">
+            <a:schemeClr val="accent1"/>
+          </a:effectRef>
+          <a:fontRef idx="minor">
+            <a:schemeClr val="lt1"/>
+          </a:fontRef>
+        </p:style>
+        <p:txBody>
+          <a:bodyPr rtlCol="0" anchor="ctr"/>
+          <a:lstStyle/>
+          <a:p>
+            <a:pPr algn="ctr"/>
+            <a:endParaRPr lang="en-US"/>
+          </a:p>
+        </p:txBody>
+      </p:sp>
+      <p:sp>
+        <p:nvSpPr>
+          <p:cNvPr id="8" name="Smiley Face 7">
+            <a:extLst>
+              <a:ext uri="{FF2B5EF4-FFF2-40B4-BE49-F238E27FC236}">
+                <a16:creationId xmlns:a16="http://schemas.microsoft.com/office/drawing/2014/main" id="{F4E4312C-71B8-3C7F-BED0-7E720DB645E8}"/>
+              </a:ext>
+            </a:extLst>
+          </p:cNvPr>
+          <p:cNvSpPr/>
+          <p:nvPr/>
+        </p:nvSpPr>
+        <p:spPr>
+          <a:xfrm>
+            <a:off x="431800" y="4734900"/>
+            <a:ext cx="393518" cy="371789"/>
+          </a:xfrm>
+          <a:prstGeom prst="smileyFace">
+            <a:avLst/>
+          </a:prstGeom>
+          <a:solidFill>
+            <a:srgbClr val="FFFF00"/>
+          </a:solidFill>
+          <a:ln w="31750">
+            <a:solidFill>
+              <a:schemeClr val="tx1"/>
+            </a:solidFill>
+          </a:ln>
+        </p:spPr>
+        <p:style>
+          <a:lnRef idx="2">
+            <a:schemeClr val="accent1">
+              <a:shade val="50000"/>
+            </a:schemeClr>
+          </a:lnRef>
+          <a:fillRef idx="1">
+            <a:schemeClr val="accent1"/>
+          </a:fillRef>
+          <a:effectRef idx="0">
+            <a:schemeClr val="accent1"/>
+          </a:effectRef>
+          <a:fontRef idx="minor">
+            <a:schemeClr val="lt1"/>
+          </a:fontRef>
+        </p:style>
+        <p:txBody>
+          <a:bodyPr rtlCol="0" anchor="ctr"/>
+          <a:lstStyle/>
+          <a:p>
+            <a:pPr algn="ctr"/>
+            <a:endParaRPr lang="en-US"/>
+          </a:p>
+        </p:txBody>
+      </p:sp>
+      <p:sp>
+        <p:nvSpPr>
+          <p:cNvPr id="9" name="Smiley Face 8">
+            <a:extLst>
+              <a:ext uri="{FF2B5EF4-FFF2-40B4-BE49-F238E27FC236}">
+                <a16:creationId xmlns:a16="http://schemas.microsoft.com/office/drawing/2014/main" id="{A2334969-4290-B6E3-7317-B667F4A70D18}"/>
+              </a:ext>
+            </a:extLst>
+          </p:cNvPr>
+          <p:cNvSpPr/>
+          <p:nvPr/>
+        </p:nvSpPr>
+        <p:spPr>
+          <a:xfrm>
+            <a:off x="11164618" y="5253380"/>
+            <a:ext cx="393518" cy="371789"/>
+          </a:xfrm>
+          <a:prstGeom prst="smileyFace">
+            <a:avLst/>
+          </a:prstGeom>
+          <a:solidFill>
+            <a:srgbClr val="FFFF00"/>
+          </a:solidFill>
+          <a:ln w="31750">
+            <a:solidFill>
+              <a:schemeClr val="tx1"/>
+            </a:solidFill>
+          </a:ln>
+        </p:spPr>
+        <p:style>
+          <a:lnRef idx="2">
+            <a:schemeClr val="accent1">
+              <a:shade val="50000"/>
+            </a:schemeClr>
+          </a:lnRef>
+          <a:fillRef idx="1">
+            <a:schemeClr val="accent1"/>
+          </a:fillRef>
+          <a:effectRef idx="0">
+            <a:schemeClr val="accent1"/>
+          </a:effectRef>
+          <a:fontRef idx="minor">
+            <a:schemeClr val="lt1"/>
+          </a:fontRef>
+        </p:style>
+        <p:txBody>
+          <a:bodyPr rtlCol="0" anchor="ctr"/>
+          <a:lstStyle/>
+          <a:p>
+            <a:pPr algn="ctr"/>
+            <a:endParaRPr lang="en-US"/>
+          </a:p>
+        </p:txBody>
+      </p:sp>
+      <p:sp>
+        <p:nvSpPr>
+          <p:cNvPr id="10" name="Smiley Face 9">
+            <a:extLst>
+              <a:ext uri="{FF2B5EF4-FFF2-40B4-BE49-F238E27FC236}">
+                <a16:creationId xmlns:a16="http://schemas.microsoft.com/office/drawing/2014/main" id="{AD51D5DB-4480-7E9C-95B0-E12F70F01B25}"/>
+              </a:ext>
+            </a:extLst>
+          </p:cNvPr>
+          <p:cNvSpPr/>
+          <p:nvPr/>
+        </p:nvSpPr>
+        <p:spPr>
+          <a:xfrm>
+            <a:off x="431800" y="5789665"/>
+            <a:ext cx="393518" cy="371789"/>
+          </a:xfrm>
+          <a:prstGeom prst="smileyFace">
+            <a:avLst/>
+          </a:prstGeom>
+          <a:solidFill>
+            <a:srgbClr val="FFFF00"/>
+          </a:solidFill>
+          <a:ln w="31750">
+            <a:solidFill>
+              <a:schemeClr val="tx1"/>
+            </a:solidFill>
+          </a:ln>
+        </p:spPr>
+        <p:style>
+          <a:lnRef idx="2">
+            <a:schemeClr val="accent1">
+              <a:shade val="50000"/>
+            </a:schemeClr>
+          </a:lnRef>
+          <a:fillRef idx="1">
+            <a:schemeClr val="accent1"/>
+          </a:fillRef>
+          <a:effectRef idx="0">
+            <a:schemeClr val="accent1"/>
+          </a:effectRef>
+          <a:fontRef idx="minor">
+            <a:schemeClr val="lt1"/>
+          </a:fontRef>
+        </p:style>
+        <p:txBody>
+          <a:bodyPr rtlCol="0" anchor="ctr"/>
+          <a:lstStyle/>
+          <a:p>
+            <a:pPr algn="ctr"/>
+            <a:endParaRPr lang="en-US"/>
+          </a:p>
+        </p:txBody>
+      </p:sp>
+      <p:sp>
+        <p:nvSpPr>
+          <p:cNvPr id="11" name="Smiley Face 10">
+            <a:extLst>
+              <a:ext uri="{FF2B5EF4-FFF2-40B4-BE49-F238E27FC236}">
+                <a16:creationId xmlns:a16="http://schemas.microsoft.com/office/drawing/2014/main" id="{09E265EB-900D-F8AF-C9C9-F5B6DDB7FBD2}"/>
+              </a:ext>
+            </a:extLst>
+          </p:cNvPr>
+          <p:cNvSpPr/>
+          <p:nvPr/>
+        </p:nvSpPr>
+        <p:spPr>
+          <a:xfrm>
+            <a:off x="825318" y="5789665"/>
+            <a:ext cx="393518" cy="371789"/>
+          </a:xfrm>
+          <a:prstGeom prst="smileyFace">
+            <a:avLst/>
+          </a:prstGeom>
+          <a:solidFill>
+            <a:srgbClr val="FFFF00"/>
+          </a:solidFill>
+          <a:ln w="31750">
+            <a:solidFill>
+              <a:schemeClr val="tx1"/>
+            </a:solidFill>
+          </a:ln>
+        </p:spPr>
+        <p:style>
+          <a:lnRef idx="2">
+            <a:schemeClr val="accent1">
+              <a:shade val="50000"/>
+            </a:schemeClr>
+          </a:lnRef>
+          <a:fillRef idx="1">
+            <a:schemeClr val="accent1"/>
+          </a:fillRef>
+          <a:effectRef idx="0">
+            <a:schemeClr val="accent1"/>
+          </a:effectRef>
+          <a:fontRef idx="minor">
+            <a:schemeClr val="lt1"/>
+          </a:fontRef>
+        </p:style>
+        <p:txBody>
+          <a:bodyPr rtlCol="0" anchor="ctr"/>
+          <a:lstStyle/>
+          <a:p>
+            <a:pPr algn="ctr"/>
+            <a:endParaRPr lang="en-US"/>
+          </a:p>
+        </p:txBody>
+      </p:sp>
+      <p:sp>
+        <p:nvSpPr>
+          <p:cNvPr id="12" name="Smiley Face 11">
+            <a:extLst>
+              <a:ext uri="{FF2B5EF4-FFF2-40B4-BE49-F238E27FC236}">
+                <a16:creationId xmlns:a16="http://schemas.microsoft.com/office/drawing/2014/main" id="{4AED2484-D3C0-258D-215A-ECACB6644050}"/>
+              </a:ext>
+            </a:extLst>
+          </p:cNvPr>
+          <p:cNvSpPr/>
+          <p:nvPr/>
+        </p:nvSpPr>
+        <p:spPr>
+          <a:xfrm>
+            <a:off x="1218836" y="5789665"/>
+            <a:ext cx="393518" cy="371789"/>
+          </a:xfrm>
+          <a:prstGeom prst="smileyFace">
+            <a:avLst/>
+          </a:prstGeom>
+          <a:solidFill>
+            <a:srgbClr val="FFFF00"/>
+          </a:solidFill>
+          <a:ln w="31750">
+            <a:solidFill>
+              <a:schemeClr val="tx1"/>
+            </a:solidFill>
+          </a:ln>
+        </p:spPr>
+        <p:style>
+          <a:lnRef idx="2">
+            <a:schemeClr val="accent1">
+              <a:shade val="50000"/>
+            </a:schemeClr>
+          </a:lnRef>
+          <a:fillRef idx="1">
+            <a:schemeClr val="accent1"/>
+          </a:fillRef>
+          <a:effectRef idx="0">
+            <a:schemeClr val="accent1"/>
+          </a:effectRef>
+          <a:fontRef idx="minor">
+            <a:schemeClr val="lt1"/>
+          </a:fontRef>
+        </p:style>
+        <p:txBody>
+          <a:bodyPr rtlCol="0" anchor="ctr"/>
+          <a:lstStyle/>
+          <a:p>
+            <a:pPr algn="ctr"/>
+            <a:endParaRPr lang="en-US"/>
+          </a:p>
+        </p:txBody>
+      </p:sp>
+    </p:spTree>
+    <p:extLst>
+      <p:ext uri="{BB962C8B-B14F-4D97-AF65-F5344CB8AC3E}">
+        <p14:creationId xmlns:p14="http://schemas.microsoft.com/office/powerpoint/2010/main" val="3721555009"/>
+      </p:ext>
+    </p:extLst>
+  </p:cSld>
+  <p:clrMapOvr>
+    <a:masterClrMapping/>
+  </p:clrMapOvr>
+  <p:timing>
+    <p:tnLst>
+      <p:par>
+        <p:cTn id="1" dur="indefinite" restart="never" nodeType="tmRoot">
+          <p:childTnLst>
+            <p:seq concurrent="1" nextAc="seek">
+              <p:cTn id="2" dur="indefinite" nodeType="mainSeq">
+                <p:childTnLst>
+                  <p:par>
+                    <p:cTn id="3" fill="hold">
+                      <p:stCondLst>
+                        <p:cond delay="indefinite"/>
+                      </p:stCondLst>
+                      <p:childTnLst>
+                        <p:par>
+                          <p:cTn id="4" fill="hold">
+                            <p:stCondLst>
+                              <p:cond delay="0"/>
+                            </p:stCondLst>
+                            <p:childTnLst>
+                              <p:par>
+                                <p:cTn id="5" presetID="1" presetClass="entr" presetSubtype="0" fill="hold" nodeType="clickEffect">
+                                  <p:stCondLst>
+                                    <p:cond delay="0"/>
+                                  </p:stCondLst>
+                                  <p:childTnLst>
+                                    <p:set>
+                                      <p:cBhvr>
+                                        <p:cTn id="6" dur="1" fill="hold">
+                                          <p:stCondLst>
+                                            <p:cond delay="0"/>
+                                          </p:stCondLst>
+                                        </p:cTn>
+                                        <p:tgtEl>
+                                          <p:spTgt spid="3">
+                                            <p:txEl>
+                                              <p:pRg st="0" end="0"/>
+                                            </p:txEl>
+                                          </p:spTgt>
+                                        </p:tgtEl>
+                                        <p:attrNameLst>
+                                          <p:attrName>style.visibility</p:attrName>
+                                        </p:attrNameLst>
+                                      </p:cBhvr>
+                                      <p:to>
+                                        <p:strVal val="visible"/>
+                                      </p:to>
+                                    </p:set>
+                                  </p:childTnLst>
+                                </p:cTn>
+                              </p:par>
+                              <p:par>
+                                <p:cTn id="7" presetID="1" presetClass="entr" presetSubtype="0" fill="hold" grpId="0" nodeType="withEffect">
+                                  <p:stCondLst>
+                                    <p:cond delay="0"/>
+                                  </p:stCondLst>
+                                  <p:childTnLst>
+                                    <p:set>
+                                      <p:cBhvr>
+                                        <p:cTn id="8" dur="1" fill="hold">
+                                          <p:stCondLst>
+                                            <p:cond delay="0"/>
+                                          </p:stCondLst>
+                                        </p:cTn>
+                                        <p:tgtEl>
+                                          <p:spTgt spid="4"/>
+                                        </p:tgtEl>
+                                        <p:attrNameLst>
+                                          <p:attrName>style.visibility</p:attrName>
+                                        </p:attrNameLst>
+                                      </p:cBhvr>
+                                      <p:to>
+                                        <p:strVal val="visible"/>
+                                      </p:to>
+                                    </p:set>
+                                  </p:childTnLst>
+                                </p:cTn>
+                              </p:par>
+                            </p:childTnLst>
+                          </p:cTn>
+                        </p:par>
+                      </p:childTnLst>
+                    </p:cTn>
+                  </p:par>
+                  <p:par>
+                    <p:cTn id="9" fill="hold">
+                      <p:stCondLst>
+                        <p:cond delay="indefinite"/>
+                      </p:stCondLst>
+                      <p:childTnLst>
+                        <p:par>
+                          <p:cTn id="10" fill="hold">
+                            <p:stCondLst>
+                              <p:cond delay="0"/>
+                            </p:stCondLst>
+                            <p:childTnLst>
+                              <p:par>
+                                <p:cTn id="11" presetID="1" presetClass="entr" presetSubtype="0" fill="hold" nodeType="clickEffect">
+                                  <p:stCondLst>
+                                    <p:cond delay="0"/>
+                                  </p:stCondLst>
+                                  <p:childTnLst>
+                                    <p:set>
+                                      <p:cBhvr>
+                                        <p:cTn id="12" dur="1" fill="hold">
+                                          <p:stCondLst>
+                                            <p:cond delay="0"/>
+                                          </p:stCondLst>
+                                        </p:cTn>
+                                        <p:tgtEl>
+                                          <p:spTgt spid="3">
+                                            <p:txEl>
+                                              <p:pRg st="1" end="1"/>
+                                            </p:txEl>
+                                          </p:spTgt>
+                                        </p:tgtEl>
+                                        <p:attrNameLst>
+                                          <p:attrName>style.visibility</p:attrName>
+                                        </p:attrNameLst>
+                                      </p:cBhvr>
+                                      <p:to>
+                                        <p:strVal val="visible"/>
+                                      </p:to>
+                                    </p:set>
+                                  </p:childTnLst>
+                                </p:cTn>
+                              </p:par>
+                              <p:par>
+                                <p:cTn id="13" presetID="1" presetClass="entr" presetSubtype="0" fill="hold" grpId="0" nodeType="withEffect">
+                                  <p:stCondLst>
+                                    <p:cond delay="0"/>
+                                  </p:stCondLst>
+                                  <p:childTnLst>
+                                    <p:set>
+                                      <p:cBhvr>
+                                        <p:cTn id="14" dur="1" fill="hold">
+                                          <p:stCondLst>
+                                            <p:cond delay="0"/>
+                                          </p:stCondLst>
+                                        </p:cTn>
+                                        <p:tgtEl>
+                                          <p:spTgt spid="5"/>
+                                        </p:tgtEl>
+                                        <p:attrNameLst>
+                                          <p:attrName>style.visibility</p:attrName>
+                                        </p:attrNameLst>
+                                      </p:cBhvr>
+                                      <p:to>
+                                        <p:strVal val="visible"/>
+                                      </p:to>
+                                    </p:set>
+                                  </p:childTnLst>
+                                </p:cTn>
+                              </p:par>
+                            </p:childTnLst>
+                          </p:cTn>
+                        </p:par>
+                      </p:childTnLst>
+                    </p:cTn>
+                  </p:par>
+                  <p:par>
+                    <p:cTn id="15" fill="hold">
+                      <p:stCondLst>
+                        <p:cond delay="indefinite"/>
+                      </p:stCondLst>
+                      <p:childTnLst>
+                        <p:par>
+                          <p:cTn id="16" fill="hold">
+                            <p:stCondLst>
+                              <p:cond delay="0"/>
+                            </p:stCondLst>
+                            <p:childTnLst>
+                              <p:par>
+                                <p:cTn id="17" presetID="1" presetClass="entr" presetSubtype="0" fill="hold" nodeType="clickEffect">
+                                  <p:stCondLst>
+                                    <p:cond delay="0"/>
+                                  </p:stCondLst>
+                                  <p:childTnLst>
+                                    <p:set>
+                                      <p:cBhvr>
+                                        <p:cTn id="18" dur="1" fill="hold">
+                                          <p:stCondLst>
+                                            <p:cond delay="0"/>
+                                          </p:stCondLst>
+                                        </p:cTn>
+                                        <p:tgtEl>
+                                          <p:spTgt spid="3">
+                                            <p:txEl>
+                                              <p:pRg st="2" end="2"/>
+                                            </p:txEl>
+                                          </p:spTgt>
+                                        </p:tgtEl>
+                                        <p:attrNameLst>
+                                          <p:attrName>style.visibility</p:attrName>
+                                        </p:attrNameLst>
+                                      </p:cBhvr>
+                                      <p:to>
+                                        <p:strVal val="visible"/>
+                                      </p:to>
+                                    </p:set>
+                                  </p:childTnLst>
+                                </p:cTn>
+                              </p:par>
+                              <p:par>
+                                <p:cTn id="19" presetID="1" presetClass="entr" presetSubtype="0" fill="hold" grpId="0" nodeType="withEffect">
+                                  <p:stCondLst>
+                                    <p:cond delay="0"/>
+                                  </p:stCondLst>
+                                  <p:childTnLst>
+                                    <p:set>
+                                      <p:cBhvr>
+                                        <p:cTn id="20" dur="1" fill="hold">
+                                          <p:stCondLst>
+                                            <p:cond delay="0"/>
+                                          </p:stCondLst>
+                                        </p:cTn>
+                                        <p:tgtEl>
+                                          <p:spTgt spid="7"/>
+                                        </p:tgtEl>
+                                        <p:attrNameLst>
+                                          <p:attrName>style.visibility</p:attrName>
+                                        </p:attrNameLst>
+                                      </p:cBhvr>
+                                      <p:to>
+                                        <p:strVal val="visible"/>
+                                      </p:to>
+                                    </p:set>
+                                  </p:childTnLst>
+                                </p:cTn>
+                              </p:par>
+                            </p:childTnLst>
+                          </p:cTn>
+                        </p:par>
+                      </p:childTnLst>
+                    </p:cTn>
+                  </p:par>
+                  <p:par>
+                    <p:cTn id="21" fill="hold">
+                      <p:stCondLst>
+                        <p:cond delay="indefinite"/>
+                      </p:stCondLst>
+                      <p:childTnLst>
+                        <p:par>
+                          <p:cTn id="22" fill="hold">
+                            <p:stCondLst>
+                              <p:cond delay="0"/>
+                            </p:stCondLst>
+                            <p:childTnLst>
+                              <p:par>
+                                <p:cTn id="23" presetID="1" presetClass="entr" presetSubtype="0" fill="hold" nodeType="clickEffect">
+                                  <p:stCondLst>
+                                    <p:cond delay="0"/>
+                                  </p:stCondLst>
+                                  <p:childTnLst>
+                                    <p:set>
+                                      <p:cBhvr>
+                                        <p:cTn id="24" dur="1" fill="hold">
+                                          <p:stCondLst>
+                                            <p:cond delay="0"/>
+                                          </p:stCondLst>
+                                        </p:cTn>
+                                        <p:tgtEl>
+                                          <p:spTgt spid="3">
+                                            <p:txEl>
+                                              <p:pRg st="3" end="3"/>
+                                            </p:txEl>
+                                          </p:spTgt>
+                                        </p:tgtEl>
+                                        <p:attrNameLst>
+                                          <p:attrName>style.visibility</p:attrName>
+                                        </p:attrNameLst>
+                                      </p:cBhvr>
+                                      <p:to>
+                                        <p:strVal val="visible"/>
+                                      </p:to>
+                                    </p:set>
+                                  </p:childTnLst>
+                                </p:cTn>
+                              </p:par>
+                              <p:par>
+                                <p:cTn id="25" presetID="1" presetClass="entr" presetSubtype="0" fill="hold" grpId="0" nodeType="withEffect">
+                                  <p:stCondLst>
+                                    <p:cond delay="0"/>
+                                  </p:stCondLst>
+                                  <p:childTnLst>
+                                    <p:set>
+                                      <p:cBhvr>
+                                        <p:cTn id="26" dur="1" fill="hold">
+                                          <p:stCondLst>
+                                            <p:cond delay="0"/>
+                                          </p:stCondLst>
+                                        </p:cTn>
+                                        <p:tgtEl>
+                                          <p:spTgt spid="8"/>
+                                        </p:tgtEl>
+                                        <p:attrNameLst>
+                                          <p:attrName>style.visibility</p:attrName>
+                                        </p:attrNameLst>
+                                      </p:cBhvr>
+                                      <p:to>
+                                        <p:strVal val="visible"/>
+                                      </p:to>
+                                    </p:set>
+                                  </p:childTnLst>
+                                </p:cTn>
+                              </p:par>
+                            </p:childTnLst>
+                          </p:cTn>
+                        </p:par>
+                      </p:childTnLst>
+                    </p:cTn>
+                  </p:par>
+                  <p:par>
+                    <p:cTn id="27" fill="hold">
+                      <p:stCondLst>
+                        <p:cond delay="indefinite"/>
+                      </p:stCondLst>
+                      <p:childTnLst>
+                        <p:par>
+                          <p:cTn id="28" fill="hold">
+                            <p:stCondLst>
+                              <p:cond delay="0"/>
+                            </p:stCondLst>
+                            <p:childTnLst>
+                              <p:par>
+                                <p:cTn id="29" presetID="1" presetClass="entr" presetSubtype="0" fill="hold" nodeType="clickEffect">
+                                  <p:stCondLst>
+                                    <p:cond delay="0"/>
+                                  </p:stCondLst>
+                                  <p:childTnLst>
+                                    <p:set>
+                                      <p:cBhvr>
+                                        <p:cTn id="30" dur="1" fill="hold">
+                                          <p:stCondLst>
+                                            <p:cond delay="0"/>
+                                          </p:stCondLst>
+                                        </p:cTn>
+                                        <p:tgtEl>
+                                          <p:spTgt spid="3">
+                                            <p:txEl>
+                                              <p:pRg st="4" end="4"/>
+                                            </p:txEl>
+                                          </p:spTgt>
+                                        </p:tgtEl>
+                                        <p:attrNameLst>
+                                          <p:attrName>style.visibility</p:attrName>
+                                        </p:attrNameLst>
+                                      </p:cBhvr>
+                                      <p:to>
+                                        <p:strVal val="visible"/>
+                                      </p:to>
+                                    </p:set>
+                                  </p:childTnLst>
+                                </p:cTn>
+                              </p:par>
+                              <p:par>
+                                <p:cTn id="31" presetID="1" presetClass="entr" presetSubtype="0" fill="hold" grpId="0" nodeType="withEffect">
+                                  <p:stCondLst>
+                                    <p:cond delay="0"/>
+                                  </p:stCondLst>
+                                  <p:childTnLst>
+                                    <p:set>
+                                      <p:cBhvr>
+                                        <p:cTn id="32" dur="1" fill="hold">
+                                          <p:stCondLst>
+                                            <p:cond delay="0"/>
+                                          </p:stCondLst>
+                                        </p:cTn>
+                                        <p:tgtEl>
+                                          <p:spTgt spid="9"/>
+                                        </p:tgtEl>
+                                        <p:attrNameLst>
+                                          <p:attrName>style.visibility</p:attrName>
+                                        </p:attrNameLst>
+                                      </p:cBhvr>
+                                      <p:to>
+                                        <p:strVal val="visible"/>
+                                      </p:to>
+                                    </p:set>
+                                  </p:childTnLst>
+                                </p:cTn>
+                              </p:par>
+                            </p:childTnLst>
+                          </p:cTn>
+                        </p:par>
+                      </p:childTnLst>
+                    </p:cTn>
+                  </p:par>
+                  <p:par>
+                    <p:cTn id="33" fill="hold">
+                      <p:stCondLst>
+                        <p:cond delay="indefinite"/>
+                      </p:stCondLst>
+                      <p:childTnLst>
+                        <p:par>
+                          <p:cTn id="34" fill="hold">
+                            <p:stCondLst>
+                              <p:cond delay="0"/>
+                            </p:stCondLst>
+                            <p:childTnLst>
+                              <p:par>
+                                <p:cTn id="35" presetID="1" presetClass="entr" presetSubtype="0" fill="hold" nodeType="clickEffect">
+                                  <p:stCondLst>
+                                    <p:cond delay="0"/>
+                                  </p:stCondLst>
+                                  <p:childTnLst>
+                                    <p:set>
+                                      <p:cBhvr>
+                                        <p:cTn id="36" dur="1" fill="hold">
+                                          <p:stCondLst>
+                                            <p:cond delay="0"/>
+                                          </p:stCondLst>
+                                        </p:cTn>
+                                        <p:tgtEl>
+                                          <p:spTgt spid="3">
+                                            <p:txEl>
+                                              <p:pRg st="5" end="5"/>
+                                            </p:txEl>
+                                          </p:spTgt>
+                                        </p:tgtEl>
+                                        <p:attrNameLst>
+                                          <p:attrName>style.visibility</p:attrName>
+                                        </p:attrNameLst>
+                                      </p:cBhvr>
+                                      <p:to>
+                                        <p:strVal val="visible"/>
+                                      </p:to>
+                                    </p:set>
+                                  </p:childTnLst>
+                                </p:cTn>
+                              </p:par>
+                              <p:par>
+                                <p:cTn id="37" presetID="1" presetClass="entr" presetSubtype="0" fill="hold" grpId="0" nodeType="withEffect">
+                                  <p:stCondLst>
+                                    <p:cond delay="0"/>
+                                  </p:stCondLst>
+                                  <p:childTnLst>
+                                    <p:set>
+                                      <p:cBhvr>
+                                        <p:cTn id="38" dur="1" fill="hold">
+                                          <p:stCondLst>
+                                            <p:cond delay="0"/>
+                                          </p:stCondLst>
+                                        </p:cTn>
+                                        <p:tgtEl>
+                                          <p:spTgt spid="10"/>
+                                        </p:tgtEl>
+                                        <p:attrNameLst>
+                                          <p:attrName>style.visibility</p:attrName>
+                                        </p:attrNameLst>
+                                      </p:cBhvr>
+                                      <p:to>
+                                        <p:strVal val="visible"/>
+                                      </p:to>
+                                    </p:set>
+                                  </p:childTnLst>
+                                </p:cTn>
+                              </p:par>
+                              <p:par>
+                                <p:cTn id="39" presetID="1" presetClass="entr" presetSubtype="0" fill="hold" grpId="0" nodeType="withEffect">
+                                  <p:stCondLst>
+                                    <p:cond delay="0"/>
+                                  </p:stCondLst>
+                                  <p:childTnLst>
+                                    <p:set>
+                                      <p:cBhvr>
+                                        <p:cTn id="40" dur="1" fill="hold">
+                                          <p:stCondLst>
+                                            <p:cond delay="0"/>
+                                          </p:stCondLst>
+                                        </p:cTn>
+                                        <p:tgtEl>
+                                          <p:spTgt spid="11"/>
+                                        </p:tgtEl>
+                                        <p:attrNameLst>
+                                          <p:attrName>style.visibility</p:attrName>
+                                        </p:attrNameLst>
+                                      </p:cBhvr>
+                                      <p:to>
+                                        <p:strVal val="visible"/>
+                                      </p:to>
+                                    </p:set>
+                                  </p:childTnLst>
+                                </p:cTn>
+                              </p:par>
+                              <p:par>
+                                <p:cTn id="41" presetID="1" presetClass="entr" presetSubtype="0" fill="hold" grpId="0" nodeType="withEffect">
+                                  <p:stCondLst>
+                                    <p:cond delay="0"/>
+                                  </p:stCondLst>
+                                  <p:childTnLst>
+                                    <p:set>
+                                      <p:cBhvr>
+                                        <p:cTn id="42" dur="1" fill="hold">
+                                          <p:stCondLst>
+                                            <p:cond delay="0"/>
+                                          </p:stCondLst>
+                                        </p:cTn>
+                                        <p:tgtEl>
+                                          <p:spTgt spid="12"/>
+                                        </p:tgtEl>
+                                        <p:attrNameLst>
+                                          <p:attrName>style.visibility</p:attrName>
+                                        </p:attrNameLst>
+                                      </p:cBhvr>
+                                      <p:to>
+                                        <p:strVal val="visible"/>
+                                      </p:to>
+                                    </p:set>
+                                  </p:childTnLst>
+                                </p:cTn>
+                              </p:par>
+                            </p:childTnLst>
+                          </p:cTn>
+                        </p:par>
+                      </p:childTnLst>
+                    </p:cTn>
+                  </p:par>
+                </p:childTnLst>
+              </p:cTn>
+              <p:prevCondLst>
+                <p:cond evt="onPrev" delay="0">
+                  <p:tgtEl>
+                    <p:sldTgt/>
+                  </p:tgtEl>
+                </p:cond>
+              </p:prevCondLst>
+              <p:nextCondLst>
+                <p:cond evt="onNext" delay="0">
+                  <p:tgtEl>
+                    <p:sldTgt/>
+                  </p:tgtEl>
+                </p:cond>
+              </p:nextCondLst>
+            </p:seq>
+          </p:childTnLst>
+        </p:cTn>
+      </p:par>
+    </p:tnLst>
+    <p:bldLst>
+      <p:bldP spid="4" grpId="0" animBg="1"/>
+      <p:bldP spid="5" grpId="0" animBg="1"/>
+      <p:bldP spid="7" grpId="0" animBg="1"/>
+      <p:bldP spid="8" grpId="0" animBg="1"/>
+      <p:bldP spid="9" grpId="0" animBg="1"/>
+      <p:bldP spid="10" grpId="0" animBg="1"/>
+      <p:bldP spid="11" grpId="0" animBg="1"/>
+      <p:bldP spid="12" grpId="0" animBg="1"/>
+    </p:bldLst>
+  </p:timing>
+</p:sld>
+</file>
+
+<file path=ppt/slides/slide22.xml><?xml version="1.0" encoding="utf-8"?>
 <p:sld xmlns:a="http://schemas.openxmlformats.org/drawingml/2006/main" xmlns:r="http://schemas.openxmlformats.org/officeDocument/2006/relationships" xmlns:p="http://schemas.openxmlformats.org/presentationml/2006/main">
   <p:cSld>
     <p:spTree>
@@ -21016,7 +24455,7 @@
 </p:sld>
 </file>
 
-<file path=ppt/slides/slide22.xml><?xml version="1.0" encoding="utf-8"?>
+<file path=ppt/slides/slide23.xml><?xml version="1.0" encoding="utf-8"?>
 <p:sld xmlns:a="http://schemas.openxmlformats.org/drawingml/2006/main" xmlns:r="http://schemas.openxmlformats.org/officeDocument/2006/relationships" xmlns:p="http://schemas.openxmlformats.org/presentationml/2006/main">
   <p:cSld>
     <p:spTree>
@@ -21201,7 +24640,27 @@
               <a:rPr lang="en-US" dirty="0"/>
               <a:t>standardizes text to any case specified</a:t>
             </a:r>
+          </a:p>
+          <a:p>
+            <a:pPr lvl="2"/>
             <a:endParaRPr lang="en-US" b="1" dirty="0"/>
+          </a:p>
+          <a:p>
+            <a:pPr lvl="2"/>
+            <a:endParaRPr lang="en-US" b="1" dirty="0"/>
+          </a:p>
+          <a:p>
+            <a:pPr marL="914400" lvl="2" indent="0">
+              <a:buNone/>
+            </a:pPr>
+            <a:r>
+              <a:rPr lang="en-US" i="1" dirty="0"/>
+              <a:t>R shorthand:   </a:t>
+            </a:r>
+            <a:r>
+              <a:rPr lang="en-US" b="1" dirty="0"/>
+              <a:t>package::function()</a:t>
+            </a:r>
           </a:p>
         </p:txBody>
       </p:sp>
@@ -21821,7 +25280,7 @@
           <p:nvPr/>
         </p:nvPicPr>
         <p:blipFill>
-          <a:blip r:embed="rId2"/>
+          <a:blip r:embed="rId3"/>
           <a:stretch>
             <a:fillRect/>
           </a:stretch>
@@ -21851,7 +25310,7 @@
           <p:nvPr/>
         </p:nvPicPr>
         <p:blipFill>
-          <a:blip r:embed="rId2"/>
+          <a:blip r:embed="rId3"/>
           <a:stretch>
             <a:fillRect/>
           </a:stretch>
@@ -21881,7 +25340,7 @@
           <p:nvPr/>
         </p:nvPicPr>
         <p:blipFill>
-          <a:blip r:embed="rId2"/>
+          <a:blip r:embed="rId3"/>
           <a:stretch>
             <a:fillRect/>
           </a:stretch>
@@ -21911,7 +25370,7 @@
           <p:nvPr/>
         </p:nvPicPr>
         <p:blipFill>
-          <a:blip r:embed="rId2"/>
+          <a:blip r:embed="rId3"/>
           <a:stretch>
             <a:fillRect/>
           </a:stretch>
@@ -21941,7 +25400,7 @@
           <p:nvPr/>
         </p:nvPicPr>
         <p:blipFill rotWithShape="1">
-          <a:blip r:embed="rId3">
+          <a:blip r:embed="rId4">
             <a:extLst>
               <a:ext uri="{28A0092B-C50C-407E-A947-70E740481C1C}">
                 <a14:useLocalDpi xmlns:a14="http://schemas.microsoft.com/office/drawing/2010/main" val="0"/>
@@ -21976,7 +25435,7 @@
           <p:nvPr/>
         </p:nvPicPr>
         <p:blipFill rotWithShape="1">
-          <a:blip r:embed="rId3">
+          <a:blip r:embed="rId4">
             <a:extLst>
               <a:ext uri="{28A0092B-C50C-407E-A947-70E740481C1C}">
                 <a14:useLocalDpi xmlns:a14="http://schemas.microsoft.com/office/drawing/2010/main" val="0"/>
@@ -22011,7 +25470,7 @@
           <p:nvPr/>
         </p:nvPicPr>
         <p:blipFill rotWithShape="1">
-          <a:blip r:embed="rId3">
+          <a:blip r:embed="rId4">
             <a:extLst>
               <a:ext uri="{28A0092B-C50C-407E-A947-70E740481C1C}">
                 <a14:useLocalDpi xmlns:a14="http://schemas.microsoft.com/office/drawing/2010/main" val="0"/>
@@ -22046,7 +25505,7 @@
           <p:nvPr/>
         </p:nvPicPr>
         <p:blipFill rotWithShape="1">
-          <a:blip r:embed="rId3">
+          <a:blip r:embed="rId4">
             <a:extLst>
               <a:ext uri="{28A0092B-C50C-407E-A947-70E740481C1C}">
                 <a14:useLocalDpi xmlns:a14="http://schemas.microsoft.com/office/drawing/2010/main" val="0"/>
@@ -35119,4 +38578,299 @@
     </a:ext>
   </a:extLst>
 </a:theme>
+</file>
+
+<file path=ppt/theme/theme2.xml><?xml version="1.0" encoding="utf-8"?>
+<a:theme xmlns:a="http://schemas.openxmlformats.org/drawingml/2006/main" name="Office Theme">
+  <a:themeElements>
+    <a:clrScheme name="Office">
+      <a:dk1>
+        <a:sysClr val="windowText" lastClr="000000"/>
+      </a:dk1>
+      <a:lt1>
+        <a:sysClr val="window" lastClr="FFFFFF"/>
+      </a:lt1>
+      <a:dk2>
+        <a:srgbClr val="44546A"/>
+      </a:dk2>
+      <a:lt2>
+        <a:srgbClr val="E7E6E6"/>
+      </a:lt2>
+      <a:accent1>
+        <a:srgbClr val="4472C4"/>
+      </a:accent1>
+      <a:accent2>
+        <a:srgbClr val="ED7D31"/>
+      </a:accent2>
+      <a:accent3>
+        <a:srgbClr val="A5A5A5"/>
+      </a:accent3>
+      <a:accent4>
+        <a:srgbClr val="FFC000"/>
+      </a:accent4>
+      <a:accent5>
+        <a:srgbClr val="5B9BD5"/>
+      </a:accent5>
+      <a:accent6>
+        <a:srgbClr val="70AD47"/>
+      </a:accent6>
+      <a:hlink>
+        <a:srgbClr val="0563C1"/>
+      </a:hlink>
+      <a:folHlink>
+        <a:srgbClr val="954F72"/>
+      </a:folHlink>
+    </a:clrScheme>
+    <a:fontScheme name="Office">
+      <a:majorFont>
+        <a:latin typeface="Calibri Light" panose="020F0302020204030204"/>
+        <a:ea typeface=""/>
+        <a:cs typeface=""/>
+        <a:font script="Jpan" typeface="游ゴシック Light"/>
+        <a:font script="Hang" typeface="맑은 고딕"/>
+        <a:font script="Hans" typeface="等线 Light"/>
+        <a:font script="Hant" typeface="新細明體"/>
+        <a:font script="Arab" typeface="Times New Roman"/>
+        <a:font script="Hebr" typeface="Times New Roman"/>
+        <a:font script="Thai" typeface="Angsana New"/>
+        <a:font script="Ethi" typeface="Nyala"/>
+        <a:font script="Beng" typeface="Vrinda"/>
+        <a:font script="Gujr" typeface="Shruti"/>
+        <a:font script="Khmr" typeface="MoolBoran"/>
+        <a:font script="Knda" typeface="Tunga"/>
+        <a:font script="Guru" typeface="Raavi"/>
+        <a:font script="Cans" typeface="Euphemia"/>
+        <a:font script="Cher" typeface="Plantagenet Cherokee"/>
+        <a:font script="Yiii" typeface="Microsoft Yi Baiti"/>
+        <a:font script="Tibt" typeface="Microsoft Himalaya"/>
+        <a:font script="Thaa" typeface="MV Boli"/>
+        <a:font script="Deva" typeface="Mangal"/>
+        <a:font script="Telu" typeface="Gautami"/>
+        <a:font script="Taml" typeface="Latha"/>
+        <a:font script="Syrc" typeface="Estrangelo Edessa"/>
+        <a:font script="Orya" typeface="Kalinga"/>
+        <a:font script="Mlym" typeface="Kartika"/>
+        <a:font script="Laoo" typeface="DokChampa"/>
+        <a:font script="Sinh" typeface="Iskoola Pota"/>
+        <a:font script="Mong" typeface="Mongolian Baiti"/>
+        <a:font script="Viet" typeface="Times New Roman"/>
+        <a:font script="Uigh" typeface="Microsoft Uighur"/>
+        <a:font script="Geor" typeface="Sylfaen"/>
+        <a:font script="Armn" typeface="Arial"/>
+        <a:font script="Bugi" typeface="Leelawadee UI"/>
+        <a:font script="Bopo" typeface="Microsoft JhengHei"/>
+        <a:font script="Java" typeface="Javanese Text"/>
+        <a:font script="Lisu" typeface="Segoe UI"/>
+        <a:font script="Mymr" typeface="Myanmar Text"/>
+        <a:font script="Nkoo" typeface="Ebrima"/>
+        <a:font script="Olck" typeface="Nirmala UI"/>
+        <a:font script="Osma" typeface="Ebrima"/>
+        <a:font script="Phag" typeface="Phagspa"/>
+        <a:font script="Syrn" typeface="Estrangelo Edessa"/>
+        <a:font script="Syrj" typeface="Estrangelo Edessa"/>
+        <a:font script="Syre" typeface="Estrangelo Edessa"/>
+        <a:font script="Sora" typeface="Nirmala UI"/>
+        <a:font script="Tale" typeface="Microsoft Tai Le"/>
+        <a:font script="Talu" typeface="Microsoft New Tai Lue"/>
+        <a:font script="Tfng" typeface="Ebrima"/>
+      </a:majorFont>
+      <a:minorFont>
+        <a:latin typeface="Calibri" panose="020F0502020204030204"/>
+        <a:ea typeface=""/>
+        <a:cs typeface=""/>
+        <a:font script="Jpan" typeface="游ゴシック"/>
+        <a:font script="Hang" typeface="맑은 고딕"/>
+        <a:font script="Hans" typeface="等线"/>
+        <a:font script="Hant" typeface="新細明體"/>
+        <a:font script="Arab" typeface="Arial"/>
+        <a:font script="Hebr" typeface="Arial"/>
+        <a:font script="Thai" typeface="Cordia New"/>
+        <a:font script="Ethi" typeface="Nyala"/>
+        <a:font script="Beng" typeface="Vrinda"/>
+        <a:font script="Gujr" typeface="Shruti"/>
+        <a:font script="Khmr" typeface="DaunPenh"/>
+        <a:font script="Knda" typeface="Tunga"/>
+        <a:font script="Guru" typeface="Raavi"/>
+        <a:font script="Cans" typeface="Euphemia"/>
+        <a:font script="Cher" typeface="Plantagenet Cherokee"/>
+        <a:font script="Yiii" typeface="Microsoft Yi Baiti"/>
+        <a:font script="Tibt" typeface="Microsoft Himalaya"/>
+        <a:font script="Thaa" typeface="MV Boli"/>
+        <a:font script="Deva" typeface="Mangal"/>
+        <a:font script="Telu" typeface="Gautami"/>
+        <a:font script="Taml" typeface="Latha"/>
+        <a:font script="Syrc" typeface="Estrangelo Edessa"/>
+        <a:font script="Orya" typeface="Kalinga"/>
+        <a:font script="Mlym" typeface="Kartika"/>
+        <a:font script="Laoo" typeface="DokChampa"/>
+        <a:font script="Sinh" typeface="Iskoola Pota"/>
+        <a:font script="Mong" typeface="Mongolian Baiti"/>
+        <a:font script="Viet" typeface="Arial"/>
+        <a:font script="Uigh" typeface="Microsoft Uighur"/>
+        <a:font script="Geor" typeface="Sylfaen"/>
+        <a:font script="Armn" typeface="Arial"/>
+        <a:font script="Bugi" typeface="Leelawadee UI"/>
+        <a:font script="Bopo" typeface="Microsoft JhengHei"/>
+        <a:font script="Java" typeface="Javanese Text"/>
+        <a:font script="Lisu" typeface="Segoe UI"/>
+        <a:font script="Mymr" typeface="Myanmar Text"/>
+        <a:font script="Nkoo" typeface="Ebrima"/>
+        <a:font script="Olck" typeface="Nirmala UI"/>
+        <a:font script="Osma" typeface="Ebrima"/>
+        <a:font script="Phag" typeface="Phagspa"/>
+        <a:font script="Syrn" typeface="Estrangelo Edessa"/>
+        <a:font script="Syrj" typeface="Estrangelo Edessa"/>
+        <a:font script="Syre" typeface="Estrangelo Edessa"/>
+        <a:font script="Sora" typeface="Nirmala UI"/>
+        <a:font script="Tale" typeface="Microsoft Tai Le"/>
+        <a:font script="Talu" typeface="Microsoft New Tai Lue"/>
+        <a:font script="Tfng" typeface="Ebrima"/>
+      </a:minorFont>
+    </a:fontScheme>
+    <a:fmtScheme name="Office">
+      <a:fillStyleLst>
+        <a:solidFill>
+          <a:schemeClr val="phClr"/>
+        </a:solidFill>
+        <a:gradFill rotWithShape="1">
+          <a:gsLst>
+            <a:gs pos="0">
+              <a:schemeClr val="phClr">
+                <a:lumMod val="110000"/>
+                <a:satMod val="105000"/>
+                <a:tint val="67000"/>
+              </a:schemeClr>
+            </a:gs>
+            <a:gs pos="50000">
+              <a:schemeClr val="phClr">
+                <a:lumMod val="105000"/>
+                <a:satMod val="103000"/>
+                <a:tint val="73000"/>
+              </a:schemeClr>
+            </a:gs>
+            <a:gs pos="100000">
+              <a:schemeClr val="phClr">
+                <a:lumMod val="105000"/>
+                <a:satMod val="109000"/>
+                <a:tint val="81000"/>
+              </a:schemeClr>
+            </a:gs>
+          </a:gsLst>
+          <a:lin ang="5400000" scaled="0"/>
+        </a:gradFill>
+        <a:gradFill rotWithShape="1">
+          <a:gsLst>
+            <a:gs pos="0">
+              <a:schemeClr val="phClr">
+                <a:satMod val="103000"/>
+                <a:lumMod val="102000"/>
+                <a:tint val="94000"/>
+              </a:schemeClr>
+            </a:gs>
+            <a:gs pos="50000">
+              <a:schemeClr val="phClr">
+                <a:satMod val="110000"/>
+                <a:lumMod val="100000"/>
+                <a:shade val="100000"/>
+              </a:schemeClr>
+            </a:gs>
+            <a:gs pos="100000">
+              <a:schemeClr val="phClr">
+                <a:lumMod val="99000"/>
+                <a:satMod val="120000"/>
+                <a:shade val="78000"/>
+              </a:schemeClr>
+            </a:gs>
+          </a:gsLst>
+          <a:lin ang="5400000" scaled="0"/>
+        </a:gradFill>
+      </a:fillStyleLst>
+      <a:lnStyleLst>
+        <a:ln w="6350" cap="flat" cmpd="sng" algn="ctr">
+          <a:solidFill>
+            <a:schemeClr val="phClr"/>
+          </a:solidFill>
+          <a:prstDash val="solid"/>
+          <a:miter lim="800000"/>
+        </a:ln>
+        <a:ln w="12700" cap="flat" cmpd="sng" algn="ctr">
+          <a:solidFill>
+            <a:schemeClr val="phClr"/>
+          </a:solidFill>
+          <a:prstDash val="solid"/>
+          <a:miter lim="800000"/>
+        </a:ln>
+        <a:ln w="19050" cap="flat" cmpd="sng" algn="ctr">
+          <a:solidFill>
+            <a:schemeClr val="phClr"/>
+          </a:solidFill>
+          <a:prstDash val="solid"/>
+          <a:miter lim="800000"/>
+        </a:ln>
+      </a:lnStyleLst>
+      <a:effectStyleLst>
+        <a:effectStyle>
+          <a:effectLst/>
+        </a:effectStyle>
+        <a:effectStyle>
+          <a:effectLst/>
+        </a:effectStyle>
+        <a:effectStyle>
+          <a:effectLst>
+            <a:outerShdw blurRad="57150" dist="19050" dir="5400000" algn="ctr" rotWithShape="0">
+              <a:srgbClr val="000000">
+                <a:alpha val="63000"/>
+              </a:srgbClr>
+            </a:outerShdw>
+          </a:effectLst>
+        </a:effectStyle>
+      </a:effectStyleLst>
+      <a:bgFillStyleLst>
+        <a:solidFill>
+          <a:schemeClr val="phClr"/>
+        </a:solidFill>
+        <a:solidFill>
+          <a:schemeClr val="phClr">
+            <a:tint val="95000"/>
+            <a:satMod val="170000"/>
+          </a:schemeClr>
+        </a:solidFill>
+        <a:gradFill rotWithShape="1">
+          <a:gsLst>
+            <a:gs pos="0">
+              <a:schemeClr val="phClr">
+                <a:tint val="93000"/>
+                <a:satMod val="150000"/>
+                <a:shade val="98000"/>
+                <a:lumMod val="102000"/>
+              </a:schemeClr>
+            </a:gs>
+            <a:gs pos="50000">
+              <a:schemeClr val="phClr">
+                <a:tint val="98000"/>
+                <a:satMod val="130000"/>
+                <a:shade val="90000"/>
+                <a:lumMod val="103000"/>
+              </a:schemeClr>
+            </a:gs>
+            <a:gs pos="100000">
+              <a:schemeClr val="phClr">
+                <a:shade val="63000"/>
+                <a:satMod val="120000"/>
+              </a:schemeClr>
+            </a:gs>
+          </a:gsLst>
+          <a:lin ang="5400000" scaled="0"/>
+        </a:gradFill>
+      </a:bgFillStyleLst>
+    </a:fmtScheme>
+  </a:themeElements>
+  <a:objectDefaults/>
+  <a:extraClrSchemeLst/>
+  <a:extLst>
+    <a:ext uri="{05A4C25C-085E-4340-85A3-A5531E510DB2}">
+      <thm15:themeFamily xmlns:thm15="http://schemas.microsoft.com/office/thememl/2012/main" name="Office Theme" id="{62F939B6-93AF-4DB8-9C6B-D6C7DFDC589F}" vid="{4A3C46E8-61CC-4603-A589-7422A47A8E4A}"/>
+    </a:ext>
+  </a:extLst>
+</a:theme>
 </file>
</xml_diff>